<commit_message>
esc4: r: finalised report graphs and table
- made and added the graphs which I want in my report
-- wavelet analysis graphs for orbital and foram data
- also made a table for the final results
</commit_message>
<xml_diff>
--- a/earth_system_and_climate_4/term_1/practical_2/report/figures/diagrams.pptx
+++ b/earth_system_and_climate_4/term_1/practical_2/report/figures/diagrams.pptx
@@ -5,11 +5,12 @@
     <p:sldMasterId id="2147483648" r:id="rId1"/>
   </p:sldMasterIdLst>
   <p:notesMasterIdLst>
-    <p:notesMasterId r:id="rId4"/>
+    <p:notesMasterId r:id="rId5"/>
   </p:notesMasterIdLst>
   <p:sldIdLst>
     <p:sldId id="256" r:id="rId2"/>
     <p:sldId id="257" r:id="rId3"/>
+    <p:sldId id="258" r:id="rId4"/>
   </p:sldIdLst>
   <p:sldSz cx="12192000" cy="6858000"/>
   <p:notesSz cx="6858000" cy="9144000"/>
@@ -6580,7 +6581,7 @@
         </p:nvSpPr>
         <p:spPr>
           <a:xfrm>
-            <a:off x="5790049" y="5317231"/>
+            <a:off x="5869492" y="5328271"/>
             <a:ext cx="1690657" cy="338554"/>
           </a:xfrm>
           <a:prstGeom prst="rect">
@@ -6620,7 +6621,7 @@
         </p:nvSpPr>
         <p:spPr>
           <a:xfrm>
-            <a:off x="1943325" y="5317231"/>
+            <a:off x="2122919" y="5328271"/>
             <a:ext cx="1690657" cy="338554"/>
           </a:xfrm>
           <a:prstGeom prst="rect">
@@ -6660,7 +6661,7 @@
         </p:nvSpPr>
         <p:spPr>
           <a:xfrm>
-            <a:off x="9769623" y="5317231"/>
+            <a:off x="9641703" y="5328271"/>
             <a:ext cx="1690657" cy="338554"/>
           </a:xfrm>
           <a:prstGeom prst="rect">
@@ -6958,6 +6959,1960 @@
     <p:extLst>
       <p:ext uri="{BB962C8B-B14F-4D97-AF65-F5344CB8AC3E}">
         <p14:creationId xmlns:p14="http://schemas.microsoft.com/office/powerpoint/2010/main" val="3880180214"/>
+      </p:ext>
+    </p:extLst>
+  </p:cSld>
+  <p:clrMapOvr>
+    <a:masterClrMapping/>
+  </p:clrMapOvr>
+</p:sld>
+</file>
+
+<file path=ppt/slides/slide3.xml><?xml version="1.0" encoding="utf-8"?>
+<p:sld xmlns:a="http://schemas.openxmlformats.org/drawingml/2006/main" xmlns:r="http://schemas.openxmlformats.org/officeDocument/2006/relationships" xmlns:p="http://schemas.openxmlformats.org/presentationml/2006/main">
+  <p:cSld>
+    <p:spTree>
+      <p:nvGrpSpPr>
+        <p:cNvPr id="1" name=""/>
+        <p:cNvGrpSpPr/>
+        <p:nvPr/>
+      </p:nvGrpSpPr>
+      <p:grpSpPr>
+        <a:xfrm>
+          <a:off x="0" y="0"/>
+          <a:ext cx="0" cy="0"/>
+          <a:chOff x="0" y="0"/>
+          <a:chExt cx="0" cy="0"/>
+        </a:xfrm>
+      </p:grpSpPr>
+      <p:pic>
+        <p:nvPicPr>
+          <p:cNvPr id="5" name="Picture 4">
+            <a:extLst>
+              <a:ext uri="{FF2B5EF4-FFF2-40B4-BE49-F238E27FC236}">
+                <a16:creationId xmlns:a16="http://schemas.microsoft.com/office/drawing/2014/main" id="{A1187FB1-E54E-8B4A-83A5-07C78375ABB0}"/>
+              </a:ext>
+            </a:extLst>
+          </p:cNvPr>
+          <p:cNvPicPr>
+            <a:picLocks noChangeAspect="1"/>
+          </p:cNvPicPr>
+          <p:nvPr/>
+        </p:nvPicPr>
+        <p:blipFill rotWithShape="1">
+          <a:blip r:embed="rId2"/>
+          <a:srcRect l="7649" t="11683" r="7653" b="11683"/>
+          <a:stretch/>
+        </p:blipFill>
+        <p:spPr>
+          <a:xfrm>
+            <a:off x="3944607" y="1969132"/>
+            <a:ext cx="4302624" cy="2919736"/>
+          </a:xfrm>
+          <a:prstGeom prst="rect">
+            <a:avLst/>
+          </a:prstGeom>
+        </p:spPr>
+      </p:pic>
+      <p:cxnSp>
+        <p:nvCxnSpPr>
+          <p:cNvPr id="6" name="Straight Connector 5">
+            <a:extLst>
+              <a:ext uri="{FF2B5EF4-FFF2-40B4-BE49-F238E27FC236}">
+                <a16:creationId xmlns:a16="http://schemas.microsoft.com/office/drawing/2014/main" id="{1B5BB517-15FE-164A-BECE-4AF278AE964F}"/>
+              </a:ext>
+            </a:extLst>
+          </p:cNvPr>
+          <p:cNvCxnSpPr>
+            <a:cxnSpLocks/>
+          </p:cNvCxnSpPr>
+          <p:nvPr/>
+        </p:nvCxnSpPr>
+        <p:spPr>
+          <a:xfrm flipH="1">
+            <a:off x="3944768" y="4226916"/>
+            <a:ext cx="4302463" cy="0"/>
+          </a:xfrm>
+          <a:prstGeom prst="line">
+            <a:avLst/>
+          </a:prstGeom>
+          <a:ln w="34925">
+            <a:solidFill>
+              <a:schemeClr val="bg1"/>
+            </a:solidFill>
+            <a:prstDash val="dash"/>
+          </a:ln>
+        </p:spPr>
+        <p:style>
+          <a:lnRef idx="1">
+            <a:schemeClr val="accent1"/>
+          </a:lnRef>
+          <a:fillRef idx="0">
+            <a:schemeClr val="accent1"/>
+          </a:fillRef>
+          <a:effectRef idx="0">
+            <a:schemeClr val="accent1"/>
+          </a:effectRef>
+          <a:fontRef idx="minor">
+            <a:schemeClr val="tx1"/>
+          </a:fontRef>
+        </p:style>
+      </p:cxnSp>
+      <p:cxnSp>
+        <p:nvCxnSpPr>
+          <p:cNvPr id="10" name="Straight Connector 9">
+            <a:extLst>
+              <a:ext uri="{FF2B5EF4-FFF2-40B4-BE49-F238E27FC236}">
+                <a16:creationId xmlns:a16="http://schemas.microsoft.com/office/drawing/2014/main" id="{7B052140-783E-E048-9C61-B48CE6C5F124}"/>
+              </a:ext>
+            </a:extLst>
+          </p:cNvPr>
+          <p:cNvCxnSpPr>
+            <a:cxnSpLocks/>
+          </p:cNvCxnSpPr>
+          <p:nvPr/>
+        </p:nvCxnSpPr>
+        <p:spPr>
+          <a:xfrm rot="5400000" flipH="1">
+            <a:off x="3876165" y="4957310"/>
+            <a:ext cx="136884" cy="0"/>
+          </a:xfrm>
+          <a:prstGeom prst="line">
+            <a:avLst/>
+          </a:prstGeom>
+          <a:ln w="28575">
+            <a:solidFill>
+              <a:schemeClr val="tx1"/>
+            </a:solidFill>
+          </a:ln>
+        </p:spPr>
+        <p:style>
+          <a:lnRef idx="1">
+            <a:schemeClr val="accent1"/>
+          </a:lnRef>
+          <a:fillRef idx="0">
+            <a:schemeClr val="accent1"/>
+          </a:fillRef>
+          <a:effectRef idx="0">
+            <a:schemeClr val="accent1"/>
+          </a:effectRef>
+          <a:fontRef idx="minor">
+            <a:schemeClr val="tx1"/>
+          </a:fontRef>
+        </p:style>
+      </p:cxnSp>
+      <p:cxnSp>
+        <p:nvCxnSpPr>
+          <p:cNvPr id="11" name="Straight Connector 10">
+            <a:extLst>
+              <a:ext uri="{FF2B5EF4-FFF2-40B4-BE49-F238E27FC236}">
+                <a16:creationId xmlns:a16="http://schemas.microsoft.com/office/drawing/2014/main" id="{F82D113D-74FB-9245-ABBA-BDE61A13AD8E}"/>
+              </a:ext>
+            </a:extLst>
+          </p:cNvPr>
+          <p:cNvCxnSpPr>
+            <a:cxnSpLocks/>
+          </p:cNvCxnSpPr>
+          <p:nvPr/>
+        </p:nvCxnSpPr>
+        <p:spPr>
+          <a:xfrm rot="5400000" flipH="1">
+            <a:off x="4411174" y="4954089"/>
+            <a:ext cx="136884" cy="0"/>
+          </a:xfrm>
+          <a:prstGeom prst="line">
+            <a:avLst/>
+          </a:prstGeom>
+          <a:ln w="28575">
+            <a:solidFill>
+              <a:schemeClr val="tx1"/>
+            </a:solidFill>
+          </a:ln>
+        </p:spPr>
+        <p:style>
+          <a:lnRef idx="1">
+            <a:schemeClr val="accent1"/>
+          </a:lnRef>
+          <a:fillRef idx="0">
+            <a:schemeClr val="accent1"/>
+          </a:fillRef>
+          <a:effectRef idx="0">
+            <a:schemeClr val="accent1"/>
+          </a:effectRef>
+          <a:fontRef idx="minor">
+            <a:schemeClr val="tx1"/>
+          </a:fontRef>
+        </p:style>
+      </p:cxnSp>
+      <p:cxnSp>
+        <p:nvCxnSpPr>
+          <p:cNvPr id="12" name="Straight Connector 11">
+            <a:extLst>
+              <a:ext uri="{FF2B5EF4-FFF2-40B4-BE49-F238E27FC236}">
+                <a16:creationId xmlns:a16="http://schemas.microsoft.com/office/drawing/2014/main" id="{3F2F3774-F39B-4944-BF84-A65A6F34D17D}"/>
+              </a:ext>
+            </a:extLst>
+          </p:cNvPr>
+          <p:cNvCxnSpPr>
+            <a:cxnSpLocks/>
+          </p:cNvCxnSpPr>
+          <p:nvPr/>
+        </p:nvCxnSpPr>
+        <p:spPr>
+          <a:xfrm rot="5400000" flipH="1">
+            <a:off x="4936009" y="4954089"/>
+            <a:ext cx="136884" cy="0"/>
+          </a:xfrm>
+          <a:prstGeom prst="line">
+            <a:avLst/>
+          </a:prstGeom>
+          <a:ln w="28575">
+            <a:solidFill>
+              <a:schemeClr val="tx1"/>
+            </a:solidFill>
+          </a:ln>
+        </p:spPr>
+        <p:style>
+          <a:lnRef idx="1">
+            <a:schemeClr val="accent1"/>
+          </a:lnRef>
+          <a:fillRef idx="0">
+            <a:schemeClr val="accent1"/>
+          </a:fillRef>
+          <a:effectRef idx="0">
+            <a:schemeClr val="accent1"/>
+          </a:effectRef>
+          <a:fontRef idx="minor">
+            <a:schemeClr val="tx1"/>
+          </a:fontRef>
+        </p:style>
+      </p:cxnSp>
+      <p:cxnSp>
+        <p:nvCxnSpPr>
+          <p:cNvPr id="13" name="Straight Connector 12">
+            <a:extLst>
+              <a:ext uri="{FF2B5EF4-FFF2-40B4-BE49-F238E27FC236}">
+                <a16:creationId xmlns:a16="http://schemas.microsoft.com/office/drawing/2014/main" id="{2B253D10-809A-B849-8D5E-0E9728C65CBD}"/>
+              </a:ext>
+            </a:extLst>
+          </p:cNvPr>
+          <p:cNvCxnSpPr>
+            <a:cxnSpLocks/>
+          </p:cNvCxnSpPr>
+          <p:nvPr/>
+        </p:nvCxnSpPr>
+        <p:spPr>
+          <a:xfrm rot="5400000" flipH="1">
+            <a:off x="5469403" y="4954089"/>
+            <a:ext cx="136884" cy="0"/>
+          </a:xfrm>
+          <a:prstGeom prst="line">
+            <a:avLst/>
+          </a:prstGeom>
+          <a:ln w="28575">
+            <a:solidFill>
+              <a:schemeClr val="tx1"/>
+            </a:solidFill>
+          </a:ln>
+        </p:spPr>
+        <p:style>
+          <a:lnRef idx="1">
+            <a:schemeClr val="accent1"/>
+          </a:lnRef>
+          <a:fillRef idx="0">
+            <a:schemeClr val="accent1"/>
+          </a:fillRef>
+          <a:effectRef idx="0">
+            <a:schemeClr val="accent1"/>
+          </a:effectRef>
+          <a:fontRef idx="minor">
+            <a:schemeClr val="tx1"/>
+          </a:fontRef>
+        </p:style>
+      </p:cxnSp>
+      <p:cxnSp>
+        <p:nvCxnSpPr>
+          <p:cNvPr id="14" name="Straight Connector 13">
+            <a:extLst>
+              <a:ext uri="{FF2B5EF4-FFF2-40B4-BE49-F238E27FC236}">
+                <a16:creationId xmlns:a16="http://schemas.microsoft.com/office/drawing/2014/main" id="{1354DA89-BC75-C24D-BE1D-EA2AE2F7ED88}"/>
+              </a:ext>
+            </a:extLst>
+          </p:cNvPr>
+          <p:cNvCxnSpPr>
+            <a:cxnSpLocks/>
+          </p:cNvCxnSpPr>
+          <p:nvPr/>
+        </p:nvCxnSpPr>
+        <p:spPr>
+          <a:xfrm rot="5400000" flipH="1">
+            <a:off x="6008481" y="4954089"/>
+            <a:ext cx="136884" cy="0"/>
+          </a:xfrm>
+          <a:prstGeom prst="line">
+            <a:avLst/>
+          </a:prstGeom>
+          <a:ln w="28575">
+            <a:solidFill>
+              <a:schemeClr val="tx1"/>
+            </a:solidFill>
+          </a:ln>
+        </p:spPr>
+        <p:style>
+          <a:lnRef idx="1">
+            <a:schemeClr val="accent1"/>
+          </a:lnRef>
+          <a:fillRef idx="0">
+            <a:schemeClr val="accent1"/>
+          </a:fillRef>
+          <a:effectRef idx="0">
+            <a:schemeClr val="accent1"/>
+          </a:effectRef>
+          <a:fontRef idx="minor">
+            <a:schemeClr val="tx1"/>
+          </a:fontRef>
+        </p:style>
+      </p:cxnSp>
+      <p:cxnSp>
+        <p:nvCxnSpPr>
+          <p:cNvPr id="15" name="Straight Connector 14">
+            <a:extLst>
+              <a:ext uri="{FF2B5EF4-FFF2-40B4-BE49-F238E27FC236}">
+                <a16:creationId xmlns:a16="http://schemas.microsoft.com/office/drawing/2014/main" id="{61503676-3F11-5744-934F-42F93BE49C42}"/>
+              </a:ext>
+            </a:extLst>
+          </p:cNvPr>
+          <p:cNvCxnSpPr>
+            <a:cxnSpLocks/>
+          </p:cNvCxnSpPr>
+          <p:nvPr/>
+        </p:nvCxnSpPr>
+        <p:spPr>
+          <a:xfrm rot="5400000" flipH="1">
+            <a:off x="6528752" y="4957310"/>
+            <a:ext cx="136884" cy="0"/>
+          </a:xfrm>
+          <a:prstGeom prst="line">
+            <a:avLst/>
+          </a:prstGeom>
+          <a:ln w="28575">
+            <a:solidFill>
+              <a:schemeClr val="tx1"/>
+            </a:solidFill>
+          </a:ln>
+        </p:spPr>
+        <p:style>
+          <a:lnRef idx="1">
+            <a:schemeClr val="accent1"/>
+          </a:lnRef>
+          <a:fillRef idx="0">
+            <a:schemeClr val="accent1"/>
+          </a:fillRef>
+          <a:effectRef idx="0">
+            <a:schemeClr val="accent1"/>
+          </a:effectRef>
+          <a:fontRef idx="minor">
+            <a:schemeClr val="tx1"/>
+          </a:fontRef>
+        </p:style>
+      </p:cxnSp>
+      <p:cxnSp>
+        <p:nvCxnSpPr>
+          <p:cNvPr id="16" name="Straight Connector 15">
+            <a:extLst>
+              <a:ext uri="{FF2B5EF4-FFF2-40B4-BE49-F238E27FC236}">
+                <a16:creationId xmlns:a16="http://schemas.microsoft.com/office/drawing/2014/main" id="{4D719583-88F5-5A46-B377-39B5A4320852}"/>
+              </a:ext>
+            </a:extLst>
+          </p:cNvPr>
+          <p:cNvCxnSpPr>
+            <a:cxnSpLocks/>
+          </p:cNvCxnSpPr>
+          <p:nvPr/>
+        </p:nvCxnSpPr>
+        <p:spPr>
+          <a:xfrm rot="5400000" flipH="1">
+            <a:off x="7063359" y="4954089"/>
+            <a:ext cx="136884" cy="0"/>
+          </a:xfrm>
+          <a:prstGeom prst="line">
+            <a:avLst/>
+          </a:prstGeom>
+          <a:ln w="28575">
+            <a:solidFill>
+              <a:schemeClr val="tx1"/>
+            </a:solidFill>
+          </a:ln>
+        </p:spPr>
+        <p:style>
+          <a:lnRef idx="1">
+            <a:schemeClr val="accent1"/>
+          </a:lnRef>
+          <a:fillRef idx="0">
+            <a:schemeClr val="accent1"/>
+          </a:fillRef>
+          <a:effectRef idx="0">
+            <a:schemeClr val="accent1"/>
+          </a:effectRef>
+          <a:fontRef idx="minor">
+            <a:schemeClr val="tx1"/>
+          </a:fontRef>
+        </p:style>
+      </p:cxnSp>
+      <p:sp>
+        <p:nvSpPr>
+          <p:cNvPr id="18" name="TextBox 17">
+            <a:extLst>
+              <a:ext uri="{FF2B5EF4-FFF2-40B4-BE49-F238E27FC236}">
+                <a16:creationId xmlns:a16="http://schemas.microsoft.com/office/drawing/2014/main" id="{9CB477F3-0472-7B43-AAA4-2200AC52DEB3}"/>
+              </a:ext>
+            </a:extLst>
+          </p:cNvPr>
+          <p:cNvSpPr txBox="1"/>
+          <p:nvPr/>
+        </p:nvSpPr>
+        <p:spPr>
+          <a:xfrm>
+            <a:off x="3594949" y="4995446"/>
+            <a:ext cx="710527" cy="338554"/>
+          </a:xfrm>
+          <a:prstGeom prst="rect">
+            <a:avLst/>
+          </a:prstGeom>
+          <a:noFill/>
+        </p:spPr>
+        <p:txBody>
+          <a:bodyPr wrap="square" rtlCol="0">
+            <a:spAutoFit/>
+          </a:bodyPr>
+          <a:lstStyle/>
+          <a:p>
+            <a:pPr algn="ctr"/>
+            <a:r>
+              <a:rPr lang="en-GB" sz="1600" b="1" dirty="0">
+                <a:latin typeface="CMU Serif Roman" charset="0"/>
+                <a:ea typeface="CMU Serif Roman" charset="0"/>
+                <a:cs typeface="CMU Serif Roman" charset="0"/>
+              </a:rPr>
+              <a:t>0</a:t>
+            </a:r>
+          </a:p>
+        </p:txBody>
+      </p:sp>
+      <p:sp>
+        <p:nvSpPr>
+          <p:cNvPr id="19" name="TextBox 18">
+            <a:extLst>
+              <a:ext uri="{FF2B5EF4-FFF2-40B4-BE49-F238E27FC236}">
+                <a16:creationId xmlns:a16="http://schemas.microsoft.com/office/drawing/2014/main" id="{AAF0821F-E1DE-5849-84F2-1A96815962B9}"/>
+              </a:ext>
+            </a:extLst>
+          </p:cNvPr>
+          <p:cNvSpPr txBox="1"/>
+          <p:nvPr/>
+        </p:nvSpPr>
+        <p:spPr>
+          <a:xfrm>
+            <a:off x="4125073" y="5011958"/>
+            <a:ext cx="710527" cy="338554"/>
+          </a:xfrm>
+          <a:prstGeom prst="rect">
+            <a:avLst/>
+          </a:prstGeom>
+          <a:noFill/>
+        </p:spPr>
+        <p:txBody>
+          <a:bodyPr wrap="square" rtlCol="0">
+            <a:spAutoFit/>
+          </a:bodyPr>
+          <a:lstStyle/>
+          <a:p>
+            <a:pPr algn="ctr"/>
+            <a:r>
+              <a:rPr lang="en-GB" sz="1600" b="1" dirty="0">
+                <a:latin typeface="CMU Serif Roman" charset="0"/>
+                <a:ea typeface="CMU Serif Roman" charset="0"/>
+                <a:cs typeface="CMU Serif Roman" charset="0"/>
+              </a:rPr>
+              <a:t>250</a:t>
+            </a:r>
+          </a:p>
+        </p:txBody>
+      </p:sp>
+      <p:sp>
+        <p:nvSpPr>
+          <p:cNvPr id="20" name="TextBox 19">
+            <a:extLst>
+              <a:ext uri="{FF2B5EF4-FFF2-40B4-BE49-F238E27FC236}">
+                <a16:creationId xmlns:a16="http://schemas.microsoft.com/office/drawing/2014/main" id="{54A272B4-7E10-5848-9747-B0D80BC1E568}"/>
+              </a:ext>
+            </a:extLst>
+          </p:cNvPr>
+          <p:cNvSpPr txBox="1"/>
+          <p:nvPr/>
+        </p:nvSpPr>
+        <p:spPr>
+          <a:xfrm>
+            <a:off x="4651946" y="5017043"/>
+            <a:ext cx="710527" cy="338554"/>
+          </a:xfrm>
+          <a:prstGeom prst="rect">
+            <a:avLst/>
+          </a:prstGeom>
+          <a:noFill/>
+        </p:spPr>
+        <p:txBody>
+          <a:bodyPr wrap="square" rtlCol="0">
+            <a:spAutoFit/>
+          </a:bodyPr>
+          <a:lstStyle/>
+          <a:p>
+            <a:pPr algn="ctr"/>
+            <a:r>
+              <a:rPr lang="en-GB" sz="1600" b="1" dirty="0">
+                <a:latin typeface="CMU Serif Roman" charset="0"/>
+                <a:ea typeface="CMU Serif Roman" charset="0"/>
+                <a:cs typeface="CMU Serif Roman" charset="0"/>
+              </a:rPr>
+              <a:t>500</a:t>
+            </a:r>
+          </a:p>
+        </p:txBody>
+      </p:sp>
+      <p:sp>
+        <p:nvSpPr>
+          <p:cNvPr id="21" name="TextBox 20">
+            <a:extLst>
+              <a:ext uri="{FF2B5EF4-FFF2-40B4-BE49-F238E27FC236}">
+                <a16:creationId xmlns:a16="http://schemas.microsoft.com/office/drawing/2014/main" id="{B870FB94-F6FC-6645-8FE4-C5F78539E59F}"/>
+              </a:ext>
+            </a:extLst>
+          </p:cNvPr>
+          <p:cNvSpPr txBox="1"/>
+          <p:nvPr/>
+        </p:nvSpPr>
+        <p:spPr>
+          <a:xfrm>
+            <a:off x="5176780" y="5022128"/>
+            <a:ext cx="710527" cy="338554"/>
+          </a:xfrm>
+          <a:prstGeom prst="rect">
+            <a:avLst/>
+          </a:prstGeom>
+          <a:noFill/>
+        </p:spPr>
+        <p:txBody>
+          <a:bodyPr wrap="square" rtlCol="0">
+            <a:spAutoFit/>
+          </a:bodyPr>
+          <a:lstStyle/>
+          <a:p>
+            <a:pPr algn="ctr"/>
+            <a:r>
+              <a:rPr lang="en-GB" sz="1600" b="1" dirty="0">
+                <a:latin typeface="CMU Serif Roman" charset="0"/>
+                <a:ea typeface="CMU Serif Roman" charset="0"/>
+                <a:cs typeface="CMU Serif Roman" charset="0"/>
+              </a:rPr>
+              <a:t>750</a:t>
+            </a:r>
+          </a:p>
+        </p:txBody>
+      </p:sp>
+      <p:sp>
+        <p:nvSpPr>
+          <p:cNvPr id="22" name="TextBox 21">
+            <a:extLst>
+              <a:ext uri="{FF2B5EF4-FFF2-40B4-BE49-F238E27FC236}">
+                <a16:creationId xmlns:a16="http://schemas.microsoft.com/office/drawing/2014/main" id="{5A56B9A9-573E-AA41-AE99-B39C361703D5}"/>
+              </a:ext>
+            </a:extLst>
+          </p:cNvPr>
+          <p:cNvSpPr txBox="1"/>
+          <p:nvPr/>
+        </p:nvSpPr>
+        <p:spPr>
+          <a:xfrm>
+            <a:off x="5717040" y="5008989"/>
+            <a:ext cx="710527" cy="338554"/>
+          </a:xfrm>
+          <a:prstGeom prst="rect">
+            <a:avLst/>
+          </a:prstGeom>
+          <a:noFill/>
+        </p:spPr>
+        <p:txBody>
+          <a:bodyPr wrap="square" rtlCol="0">
+            <a:spAutoFit/>
+          </a:bodyPr>
+          <a:lstStyle/>
+          <a:p>
+            <a:pPr algn="ctr"/>
+            <a:r>
+              <a:rPr lang="en-GB" sz="1600" b="1" dirty="0">
+                <a:latin typeface="CMU Serif Roman" charset="0"/>
+                <a:ea typeface="CMU Serif Roman" charset="0"/>
+                <a:cs typeface="CMU Serif Roman" charset="0"/>
+              </a:rPr>
+              <a:t>1000</a:t>
+            </a:r>
+          </a:p>
+        </p:txBody>
+      </p:sp>
+      <p:sp>
+        <p:nvSpPr>
+          <p:cNvPr id="23" name="TextBox 22">
+            <a:extLst>
+              <a:ext uri="{FF2B5EF4-FFF2-40B4-BE49-F238E27FC236}">
+                <a16:creationId xmlns:a16="http://schemas.microsoft.com/office/drawing/2014/main" id="{D10D7A0C-FB2D-094F-9D2F-11EDBDDF475A}"/>
+              </a:ext>
+            </a:extLst>
+          </p:cNvPr>
+          <p:cNvSpPr txBox="1"/>
+          <p:nvPr/>
+        </p:nvSpPr>
+        <p:spPr>
+          <a:xfrm>
+            <a:off x="6243750" y="5012529"/>
+            <a:ext cx="710527" cy="338554"/>
+          </a:xfrm>
+          <a:prstGeom prst="rect">
+            <a:avLst/>
+          </a:prstGeom>
+          <a:noFill/>
+        </p:spPr>
+        <p:txBody>
+          <a:bodyPr wrap="square" rtlCol="0">
+            <a:spAutoFit/>
+          </a:bodyPr>
+          <a:lstStyle/>
+          <a:p>
+            <a:pPr algn="ctr"/>
+            <a:r>
+              <a:rPr lang="en-GB" sz="1600" b="1" dirty="0">
+                <a:latin typeface="CMU Serif Roman" charset="0"/>
+                <a:ea typeface="CMU Serif Roman" charset="0"/>
+                <a:cs typeface="CMU Serif Roman" charset="0"/>
+              </a:rPr>
+              <a:t>1250</a:t>
+            </a:r>
+          </a:p>
+        </p:txBody>
+      </p:sp>
+      <p:sp>
+        <p:nvSpPr>
+          <p:cNvPr id="24" name="TextBox 23">
+            <a:extLst>
+              <a:ext uri="{FF2B5EF4-FFF2-40B4-BE49-F238E27FC236}">
+                <a16:creationId xmlns:a16="http://schemas.microsoft.com/office/drawing/2014/main" id="{96F8BA55-2A16-954F-A496-15A4F37B8451}"/>
+              </a:ext>
+            </a:extLst>
+          </p:cNvPr>
+          <p:cNvSpPr txBox="1"/>
+          <p:nvPr/>
+        </p:nvSpPr>
+        <p:spPr>
+          <a:xfrm>
+            <a:off x="6770218" y="5013671"/>
+            <a:ext cx="710527" cy="338554"/>
+          </a:xfrm>
+          <a:prstGeom prst="rect">
+            <a:avLst/>
+          </a:prstGeom>
+          <a:noFill/>
+        </p:spPr>
+        <p:txBody>
+          <a:bodyPr wrap="square" rtlCol="0">
+            <a:spAutoFit/>
+          </a:bodyPr>
+          <a:lstStyle/>
+          <a:p>
+            <a:pPr algn="ctr"/>
+            <a:r>
+              <a:rPr lang="en-GB" sz="1600" b="1" dirty="0">
+                <a:latin typeface="CMU Serif Roman" charset="0"/>
+                <a:ea typeface="CMU Serif Roman" charset="0"/>
+                <a:cs typeface="CMU Serif Roman" charset="0"/>
+              </a:rPr>
+              <a:t>1500</a:t>
+            </a:r>
+          </a:p>
+        </p:txBody>
+      </p:sp>
+      <p:cxnSp>
+        <p:nvCxnSpPr>
+          <p:cNvPr id="41" name="Straight Connector 40">
+            <a:extLst>
+              <a:ext uri="{FF2B5EF4-FFF2-40B4-BE49-F238E27FC236}">
+                <a16:creationId xmlns:a16="http://schemas.microsoft.com/office/drawing/2014/main" id="{55F62C14-ECD9-8742-B202-6EE0BB2862E9}"/>
+              </a:ext>
+            </a:extLst>
+          </p:cNvPr>
+          <p:cNvCxnSpPr>
+            <a:cxnSpLocks/>
+          </p:cNvCxnSpPr>
+          <p:nvPr/>
+        </p:nvCxnSpPr>
+        <p:spPr>
+          <a:xfrm rot="5400000" flipH="1">
+            <a:off x="7595769" y="4954188"/>
+            <a:ext cx="136884" cy="0"/>
+          </a:xfrm>
+          <a:prstGeom prst="line">
+            <a:avLst/>
+          </a:prstGeom>
+          <a:ln w="28575">
+            <a:solidFill>
+              <a:schemeClr val="tx1"/>
+            </a:solidFill>
+          </a:ln>
+        </p:spPr>
+        <p:style>
+          <a:lnRef idx="1">
+            <a:schemeClr val="accent1"/>
+          </a:lnRef>
+          <a:fillRef idx="0">
+            <a:schemeClr val="accent1"/>
+          </a:fillRef>
+          <a:effectRef idx="0">
+            <a:schemeClr val="accent1"/>
+          </a:effectRef>
+          <a:fontRef idx="minor">
+            <a:schemeClr val="tx1"/>
+          </a:fontRef>
+        </p:style>
+      </p:cxnSp>
+      <p:cxnSp>
+        <p:nvCxnSpPr>
+          <p:cNvPr id="42" name="Straight Connector 41">
+            <a:extLst>
+              <a:ext uri="{FF2B5EF4-FFF2-40B4-BE49-F238E27FC236}">
+                <a16:creationId xmlns:a16="http://schemas.microsoft.com/office/drawing/2014/main" id="{22578937-9464-F543-B0DC-8B0AE54CAFA1}"/>
+              </a:ext>
+            </a:extLst>
+          </p:cNvPr>
+          <p:cNvCxnSpPr>
+            <a:cxnSpLocks/>
+          </p:cNvCxnSpPr>
+          <p:nvPr/>
+        </p:nvCxnSpPr>
+        <p:spPr>
+          <a:xfrm rot="5400000" flipH="1">
+            <a:off x="8124221" y="4957310"/>
+            <a:ext cx="136884" cy="0"/>
+          </a:xfrm>
+          <a:prstGeom prst="line">
+            <a:avLst/>
+          </a:prstGeom>
+          <a:ln w="28575">
+            <a:solidFill>
+              <a:schemeClr val="tx1"/>
+            </a:solidFill>
+          </a:ln>
+        </p:spPr>
+        <p:style>
+          <a:lnRef idx="1">
+            <a:schemeClr val="accent1"/>
+          </a:lnRef>
+          <a:fillRef idx="0">
+            <a:schemeClr val="accent1"/>
+          </a:fillRef>
+          <a:effectRef idx="0">
+            <a:schemeClr val="accent1"/>
+          </a:effectRef>
+          <a:fontRef idx="minor">
+            <a:schemeClr val="tx1"/>
+          </a:fontRef>
+        </p:style>
+      </p:cxnSp>
+      <p:sp>
+        <p:nvSpPr>
+          <p:cNvPr id="43" name="TextBox 42">
+            <a:extLst>
+              <a:ext uri="{FF2B5EF4-FFF2-40B4-BE49-F238E27FC236}">
+                <a16:creationId xmlns:a16="http://schemas.microsoft.com/office/drawing/2014/main" id="{C6718BE6-39CA-3840-8F84-D25E608F3494}"/>
+              </a:ext>
+            </a:extLst>
+          </p:cNvPr>
+          <p:cNvSpPr txBox="1"/>
+          <p:nvPr/>
+        </p:nvSpPr>
+        <p:spPr>
+          <a:xfrm>
+            <a:off x="7306969" y="5008989"/>
+            <a:ext cx="710527" cy="338554"/>
+          </a:xfrm>
+          <a:prstGeom prst="rect">
+            <a:avLst/>
+          </a:prstGeom>
+          <a:noFill/>
+        </p:spPr>
+        <p:txBody>
+          <a:bodyPr wrap="square" rtlCol="0">
+            <a:spAutoFit/>
+          </a:bodyPr>
+          <a:lstStyle/>
+          <a:p>
+            <a:pPr algn="ctr"/>
+            <a:r>
+              <a:rPr lang="en-GB" sz="1600" b="1" dirty="0">
+                <a:latin typeface="CMU Serif Roman" charset="0"/>
+                <a:ea typeface="CMU Serif Roman" charset="0"/>
+                <a:cs typeface="CMU Serif Roman" charset="0"/>
+              </a:rPr>
+              <a:t>1750</a:t>
+            </a:r>
+          </a:p>
+        </p:txBody>
+      </p:sp>
+      <p:sp>
+        <p:nvSpPr>
+          <p:cNvPr id="44" name="TextBox 43">
+            <a:extLst>
+              <a:ext uri="{FF2B5EF4-FFF2-40B4-BE49-F238E27FC236}">
+                <a16:creationId xmlns:a16="http://schemas.microsoft.com/office/drawing/2014/main" id="{BE8A9856-A180-4A42-A965-ABB8965E6D83}"/>
+              </a:ext>
+            </a:extLst>
+          </p:cNvPr>
+          <p:cNvSpPr txBox="1"/>
+          <p:nvPr/>
+        </p:nvSpPr>
+        <p:spPr>
+          <a:xfrm>
+            <a:off x="7842328" y="5011958"/>
+            <a:ext cx="710527" cy="338554"/>
+          </a:xfrm>
+          <a:prstGeom prst="rect">
+            <a:avLst/>
+          </a:prstGeom>
+          <a:noFill/>
+        </p:spPr>
+        <p:txBody>
+          <a:bodyPr wrap="square" rtlCol="0">
+            <a:spAutoFit/>
+          </a:bodyPr>
+          <a:lstStyle/>
+          <a:p>
+            <a:pPr algn="ctr"/>
+            <a:r>
+              <a:rPr lang="en-GB" sz="1600" b="1" dirty="0">
+                <a:latin typeface="CMU Serif Roman" charset="0"/>
+                <a:ea typeface="CMU Serif Roman" charset="0"/>
+                <a:cs typeface="CMU Serif Roman" charset="0"/>
+              </a:rPr>
+              <a:t>2000</a:t>
+            </a:r>
+          </a:p>
+        </p:txBody>
+      </p:sp>
+      <p:sp>
+        <p:nvSpPr>
+          <p:cNvPr id="45" name="TextBox 44">
+            <a:extLst>
+              <a:ext uri="{FF2B5EF4-FFF2-40B4-BE49-F238E27FC236}">
+                <a16:creationId xmlns:a16="http://schemas.microsoft.com/office/drawing/2014/main" id="{41343054-184F-294C-A6A9-EC282228A28C}"/>
+              </a:ext>
+            </a:extLst>
+          </p:cNvPr>
+          <p:cNvSpPr txBox="1"/>
+          <p:nvPr/>
+        </p:nvSpPr>
+        <p:spPr>
+          <a:xfrm>
+            <a:off x="5309658" y="5298387"/>
+            <a:ext cx="1690657" cy="338554"/>
+          </a:xfrm>
+          <a:prstGeom prst="rect">
+            <a:avLst/>
+          </a:prstGeom>
+          <a:noFill/>
+        </p:spPr>
+        <p:txBody>
+          <a:bodyPr wrap="square" rtlCol="0">
+            <a:spAutoFit/>
+          </a:bodyPr>
+          <a:lstStyle/>
+          <a:p>
+            <a:pPr algn="ctr"/>
+            <a:r>
+              <a:rPr lang="en-GB" sz="1600" b="1" dirty="0">
+                <a:latin typeface="CMU Serif Roman" charset="0"/>
+                <a:ea typeface="CMU Serif Roman" charset="0"/>
+                <a:cs typeface="CMU Serif Roman" charset="0"/>
+              </a:rPr>
+              <a:t>Row number</a:t>
+            </a:r>
+          </a:p>
+        </p:txBody>
+      </p:sp>
+      <p:pic>
+        <p:nvPicPr>
+          <p:cNvPr id="46" name="Picture 45">
+            <a:extLst>
+              <a:ext uri="{FF2B5EF4-FFF2-40B4-BE49-F238E27FC236}">
+                <a16:creationId xmlns:a16="http://schemas.microsoft.com/office/drawing/2014/main" id="{E2CEBCFC-8BB9-6F4C-8AF5-03780E233B35}"/>
+              </a:ext>
+            </a:extLst>
+          </p:cNvPr>
+          <p:cNvPicPr>
+            <a:picLocks noChangeAspect="1"/>
+          </p:cNvPicPr>
+          <p:nvPr/>
+        </p:nvPicPr>
+        <p:blipFill rotWithShape="1">
+          <a:blip r:embed="rId2"/>
+          <a:srcRect l="92750" t="36238" r="5309" b="35619"/>
+          <a:stretch/>
+        </p:blipFill>
+        <p:spPr>
+          <a:xfrm>
+            <a:off x="8333537" y="2245771"/>
+            <a:ext cx="219318" cy="2385208"/>
+          </a:xfrm>
+          <a:prstGeom prst="rect">
+            <a:avLst/>
+          </a:prstGeom>
+        </p:spPr>
+      </p:pic>
+      <p:cxnSp>
+        <p:nvCxnSpPr>
+          <p:cNvPr id="47" name="Straight Connector 46">
+            <a:extLst>
+              <a:ext uri="{FF2B5EF4-FFF2-40B4-BE49-F238E27FC236}">
+                <a16:creationId xmlns:a16="http://schemas.microsoft.com/office/drawing/2014/main" id="{3B9ED38A-3E8F-8144-B5FC-297EA48DD387}"/>
+              </a:ext>
+            </a:extLst>
+          </p:cNvPr>
+          <p:cNvCxnSpPr>
+            <a:cxnSpLocks/>
+          </p:cNvCxnSpPr>
+          <p:nvPr/>
+        </p:nvCxnSpPr>
+        <p:spPr>
+          <a:xfrm flipH="1">
+            <a:off x="3721194" y="2858628"/>
+            <a:ext cx="1516844" cy="0"/>
+          </a:xfrm>
+          <a:prstGeom prst="line">
+            <a:avLst/>
+          </a:prstGeom>
+          <a:ln w="34925">
+            <a:solidFill>
+              <a:schemeClr val="bg1"/>
+            </a:solidFill>
+            <a:prstDash val="dash"/>
+          </a:ln>
+        </p:spPr>
+        <p:style>
+          <a:lnRef idx="1">
+            <a:schemeClr val="accent1"/>
+          </a:lnRef>
+          <a:fillRef idx="0">
+            <a:schemeClr val="accent1"/>
+          </a:fillRef>
+          <a:effectRef idx="0">
+            <a:schemeClr val="accent1"/>
+          </a:effectRef>
+          <a:fontRef idx="minor">
+            <a:schemeClr val="tx1"/>
+          </a:fontRef>
+        </p:style>
+      </p:cxnSp>
+      <p:cxnSp>
+        <p:nvCxnSpPr>
+          <p:cNvPr id="49" name="Straight Connector 48">
+            <a:extLst>
+              <a:ext uri="{FF2B5EF4-FFF2-40B4-BE49-F238E27FC236}">
+                <a16:creationId xmlns:a16="http://schemas.microsoft.com/office/drawing/2014/main" id="{3474D2A7-6203-5B47-A60B-231CFF920B5E}"/>
+              </a:ext>
+            </a:extLst>
+          </p:cNvPr>
+          <p:cNvCxnSpPr>
+            <a:cxnSpLocks/>
+          </p:cNvCxnSpPr>
+          <p:nvPr/>
+        </p:nvCxnSpPr>
+        <p:spPr>
+          <a:xfrm flipH="1">
+            <a:off x="3944607" y="3279385"/>
+            <a:ext cx="786419" cy="0"/>
+          </a:xfrm>
+          <a:prstGeom prst="line">
+            <a:avLst/>
+          </a:prstGeom>
+          <a:ln w="34925">
+            <a:solidFill>
+              <a:schemeClr val="bg1"/>
+            </a:solidFill>
+            <a:prstDash val="dash"/>
+          </a:ln>
+        </p:spPr>
+        <p:style>
+          <a:lnRef idx="1">
+            <a:schemeClr val="accent1"/>
+          </a:lnRef>
+          <a:fillRef idx="0">
+            <a:schemeClr val="accent1"/>
+          </a:fillRef>
+          <a:effectRef idx="0">
+            <a:schemeClr val="accent1"/>
+          </a:effectRef>
+          <a:fontRef idx="minor">
+            <a:schemeClr val="tx1"/>
+          </a:fontRef>
+        </p:style>
+      </p:cxnSp>
+      <p:sp>
+        <p:nvSpPr>
+          <p:cNvPr id="53" name="TextBox 52">
+            <a:extLst>
+              <a:ext uri="{FF2B5EF4-FFF2-40B4-BE49-F238E27FC236}">
+                <a16:creationId xmlns:a16="http://schemas.microsoft.com/office/drawing/2014/main" id="{DA3A63D1-E5EF-C849-B36A-897CF6D07D5F}"/>
+              </a:ext>
+            </a:extLst>
+          </p:cNvPr>
+          <p:cNvSpPr txBox="1"/>
+          <p:nvPr/>
+        </p:nvSpPr>
+        <p:spPr>
+          <a:xfrm rot="16200000">
+            <a:off x="2446065" y="3107405"/>
+            <a:ext cx="1690657" cy="338554"/>
+          </a:xfrm>
+          <a:prstGeom prst="rect">
+            <a:avLst/>
+          </a:prstGeom>
+          <a:noFill/>
+        </p:spPr>
+        <p:txBody>
+          <a:bodyPr wrap="square" rtlCol="0">
+            <a:spAutoFit/>
+          </a:bodyPr>
+          <a:lstStyle/>
+          <a:p>
+            <a:pPr algn="ctr"/>
+            <a:r>
+              <a:rPr lang="en-GB" sz="1600" b="1" dirty="0">
+                <a:latin typeface="CMU Serif Roman" charset="0"/>
+                <a:ea typeface="CMU Serif Roman" charset="0"/>
+                <a:cs typeface="CMU Serif Roman" charset="0"/>
+              </a:rPr>
+              <a:t>log2 scale</a:t>
+            </a:r>
+          </a:p>
+        </p:txBody>
+      </p:sp>
+      <p:cxnSp>
+        <p:nvCxnSpPr>
+          <p:cNvPr id="54" name="Straight Connector 53">
+            <a:extLst>
+              <a:ext uri="{FF2B5EF4-FFF2-40B4-BE49-F238E27FC236}">
+                <a16:creationId xmlns:a16="http://schemas.microsoft.com/office/drawing/2014/main" id="{C7B949AF-DD1A-B648-8563-DFEE91822DB4}"/>
+              </a:ext>
+            </a:extLst>
+          </p:cNvPr>
+          <p:cNvCxnSpPr>
+            <a:cxnSpLocks/>
+          </p:cNvCxnSpPr>
+          <p:nvPr/>
+        </p:nvCxnSpPr>
+        <p:spPr>
+          <a:xfrm flipH="1">
+            <a:off x="3811617" y="4599216"/>
+            <a:ext cx="136884" cy="0"/>
+          </a:xfrm>
+          <a:prstGeom prst="line">
+            <a:avLst/>
+          </a:prstGeom>
+          <a:ln w="28575">
+            <a:solidFill>
+              <a:schemeClr val="tx1"/>
+            </a:solidFill>
+          </a:ln>
+        </p:spPr>
+        <p:style>
+          <a:lnRef idx="1">
+            <a:schemeClr val="accent1"/>
+          </a:lnRef>
+          <a:fillRef idx="0">
+            <a:schemeClr val="accent1"/>
+          </a:fillRef>
+          <a:effectRef idx="0">
+            <a:schemeClr val="accent1"/>
+          </a:effectRef>
+          <a:fontRef idx="minor">
+            <a:schemeClr val="tx1"/>
+          </a:fontRef>
+        </p:style>
+      </p:cxnSp>
+      <p:cxnSp>
+        <p:nvCxnSpPr>
+          <p:cNvPr id="55" name="Straight Connector 54">
+            <a:extLst>
+              <a:ext uri="{FF2B5EF4-FFF2-40B4-BE49-F238E27FC236}">
+                <a16:creationId xmlns:a16="http://schemas.microsoft.com/office/drawing/2014/main" id="{0D07E881-AC0A-BB4E-992F-DEC0CB4C7D3D}"/>
+              </a:ext>
+            </a:extLst>
+          </p:cNvPr>
+          <p:cNvCxnSpPr>
+            <a:cxnSpLocks/>
+          </p:cNvCxnSpPr>
+          <p:nvPr/>
+        </p:nvCxnSpPr>
+        <p:spPr>
+          <a:xfrm flipH="1">
+            <a:off x="3811617" y="4269172"/>
+            <a:ext cx="136884" cy="0"/>
+          </a:xfrm>
+          <a:prstGeom prst="line">
+            <a:avLst/>
+          </a:prstGeom>
+          <a:ln w="28575">
+            <a:solidFill>
+              <a:schemeClr val="tx1"/>
+            </a:solidFill>
+          </a:ln>
+        </p:spPr>
+        <p:style>
+          <a:lnRef idx="1">
+            <a:schemeClr val="accent1"/>
+          </a:lnRef>
+          <a:fillRef idx="0">
+            <a:schemeClr val="accent1"/>
+          </a:fillRef>
+          <a:effectRef idx="0">
+            <a:schemeClr val="accent1"/>
+          </a:effectRef>
+          <a:fontRef idx="minor">
+            <a:schemeClr val="tx1"/>
+          </a:fontRef>
+        </p:style>
+      </p:cxnSp>
+      <p:cxnSp>
+        <p:nvCxnSpPr>
+          <p:cNvPr id="56" name="Straight Connector 55">
+            <a:extLst>
+              <a:ext uri="{FF2B5EF4-FFF2-40B4-BE49-F238E27FC236}">
+                <a16:creationId xmlns:a16="http://schemas.microsoft.com/office/drawing/2014/main" id="{C43F1985-77F1-DC4F-BEC5-8D754D063E8C}"/>
+              </a:ext>
+            </a:extLst>
+          </p:cNvPr>
+          <p:cNvCxnSpPr>
+            <a:cxnSpLocks/>
+          </p:cNvCxnSpPr>
+          <p:nvPr/>
+        </p:nvCxnSpPr>
+        <p:spPr>
+          <a:xfrm flipH="1">
+            <a:off x="3811617" y="1989872"/>
+            <a:ext cx="136884" cy="0"/>
+          </a:xfrm>
+          <a:prstGeom prst="line">
+            <a:avLst/>
+          </a:prstGeom>
+          <a:ln w="28575">
+            <a:solidFill>
+              <a:schemeClr val="tx1"/>
+            </a:solidFill>
+          </a:ln>
+        </p:spPr>
+        <p:style>
+          <a:lnRef idx="1">
+            <a:schemeClr val="accent1"/>
+          </a:lnRef>
+          <a:fillRef idx="0">
+            <a:schemeClr val="accent1"/>
+          </a:fillRef>
+          <a:effectRef idx="0">
+            <a:schemeClr val="accent1"/>
+          </a:effectRef>
+          <a:fontRef idx="minor">
+            <a:schemeClr val="tx1"/>
+          </a:fontRef>
+        </p:style>
+      </p:cxnSp>
+      <p:cxnSp>
+        <p:nvCxnSpPr>
+          <p:cNvPr id="57" name="Straight Connector 56">
+            <a:extLst>
+              <a:ext uri="{FF2B5EF4-FFF2-40B4-BE49-F238E27FC236}">
+                <a16:creationId xmlns:a16="http://schemas.microsoft.com/office/drawing/2014/main" id="{430CA8D3-B26C-7140-9C8C-E4CA832CECDF}"/>
+              </a:ext>
+            </a:extLst>
+          </p:cNvPr>
+          <p:cNvCxnSpPr>
+            <a:cxnSpLocks/>
+          </p:cNvCxnSpPr>
+          <p:nvPr/>
+        </p:nvCxnSpPr>
+        <p:spPr>
+          <a:xfrm flipH="1">
+            <a:off x="3811617" y="2284233"/>
+            <a:ext cx="136884" cy="0"/>
+          </a:xfrm>
+          <a:prstGeom prst="line">
+            <a:avLst/>
+          </a:prstGeom>
+          <a:ln w="28575">
+            <a:solidFill>
+              <a:schemeClr val="tx1"/>
+            </a:solidFill>
+          </a:ln>
+        </p:spPr>
+        <p:style>
+          <a:lnRef idx="1">
+            <a:schemeClr val="accent1"/>
+          </a:lnRef>
+          <a:fillRef idx="0">
+            <a:schemeClr val="accent1"/>
+          </a:fillRef>
+          <a:effectRef idx="0">
+            <a:schemeClr val="accent1"/>
+          </a:effectRef>
+          <a:fontRef idx="minor">
+            <a:schemeClr val="tx1"/>
+          </a:fontRef>
+        </p:style>
+      </p:cxnSp>
+      <p:cxnSp>
+        <p:nvCxnSpPr>
+          <p:cNvPr id="58" name="Straight Connector 57">
+            <a:extLst>
+              <a:ext uri="{FF2B5EF4-FFF2-40B4-BE49-F238E27FC236}">
+                <a16:creationId xmlns:a16="http://schemas.microsoft.com/office/drawing/2014/main" id="{FF97426C-89AA-584D-BA1D-BF2EFA9A7AA8}"/>
+              </a:ext>
+            </a:extLst>
+          </p:cNvPr>
+          <p:cNvCxnSpPr>
+            <a:cxnSpLocks/>
+          </p:cNvCxnSpPr>
+          <p:nvPr/>
+        </p:nvCxnSpPr>
+        <p:spPr>
+          <a:xfrm flipH="1">
+            <a:off x="3811617" y="2620822"/>
+            <a:ext cx="136884" cy="0"/>
+          </a:xfrm>
+          <a:prstGeom prst="line">
+            <a:avLst/>
+          </a:prstGeom>
+          <a:ln w="28575">
+            <a:solidFill>
+              <a:schemeClr val="tx1"/>
+            </a:solidFill>
+          </a:ln>
+        </p:spPr>
+        <p:style>
+          <a:lnRef idx="1">
+            <a:schemeClr val="accent1"/>
+          </a:lnRef>
+          <a:fillRef idx="0">
+            <a:schemeClr val="accent1"/>
+          </a:fillRef>
+          <a:effectRef idx="0">
+            <a:schemeClr val="accent1"/>
+          </a:effectRef>
+          <a:fontRef idx="minor">
+            <a:schemeClr val="tx1"/>
+          </a:fontRef>
+        </p:style>
+      </p:cxnSp>
+      <p:cxnSp>
+        <p:nvCxnSpPr>
+          <p:cNvPr id="59" name="Straight Connector 58">
+            <a:extLst>
+              <a:ext uri="{FF2B5EF4-FFF2-40B4-BE49-F238E27FC236}">
+                <a16:creationId xmlns:a16="http://schemas.microsoft.com/office/drawing/2014/main" id="{64B008A9-F96E-4149-A4D2-4BD3A6B08EE2}"/>
+              </a:ext>
+            </a:extLst>
+          </p:cNvPr>
+          <p:cNvCxnSpPr>
+            <a:cxnSpLocks/>
+          </p:cNvCxnSpPr>
+          <p:nvPr/>
+        </p:nvCxnSpPr>
+        <p:spPr>
+          <a:xfrm flipH="1">
+            <a:off x="3811617" y="2952736"/>
+            <a:ext cx="136884" cy="0"/>
+          </a:xfrm>
+          <a:prstGeom prst="line">
+            <a:avLst/>
+          </a:prstGeom>
+          <a:ln w="28575">
+            <a:solidFill>
+              <a:schemeClr val="tx1"/>
+            </a:solidFill>
+          </a:ln>
+        </p:spPr>
+        <p:style>
+          <a:lnRef idx="1">
+            <a:schemeClr val="accent1"/>
+          </a:lnRef>
+          <a:fillRef idx="0">
+            <a:schemeClr val="accent1"/>
+          </a:fillRef>
+          <a:effectRef idx="0">
+            <a:schemeClr val="accent1"/>
+          </a:effectRef>
+          <a:fontRef idx="minor">
+            <a:schemeClr val="tx1"/>
+          </a:fontRef>
+        </p:style>
+      </p:cxnSp>
+      <p:cxnSp>
+        <p:nvCxnSpPr>
+          <p:cNvPr id="60" name="Straight Connector 59">
+            <a:extLst>
+              <a:ext uri="{FF2B5EF4-FFF2-40B4-BE49-F238E27FC236}">
+                <a16:creationId xmlns:a16="http://schemas.microsoft.com/office/drawing/2014/main" id="{4B2B3001-B9E6-DD4A-990E-A06F7B86E612}"/>
+              </a:ext>
+            </a:extLst>
+          </p:cNvPr>
+          <p:cNvCxnSpPr>
+            <a:cxnSpLocks/>
+          </p:cNvCxnSpPr>
+          <p:nvPr/>
+        </p:nvCxnSpPr>
+        <p:spPr>
+          <a:xfrm flipH="1">
+            <a:off x="3811617" y="3276683"/>
+            <a:ext cx="136884" cy="0"/>
+          </a:xfrm>
+          <a:prstGeom prst="line">
+            <a:avLst/>
+          </a:prstGeom>
+          <a:ln w="28575">
+            <a:solidFill>
+              <a:schemeClr val="tx1"/>
+            </a:solidFill>
+          </a:ln>
+        </p:spPr>
+        <p:style>
+          <a:lnRef idx="1">
+            <a:schemeClr val="accent1"/>
+          </a:lnRef>
+          <a:fillRef idx="0">
+            <a:schemeClr val="accent1"/>
+          </a:fillRef>
+          <a:effectRef idx="0">
+            <a:schemeClr val="accent1"/>
+          </a:effectRef>
+          <a:fontRef idx="minor">
+            <a:schemeClr val="tx1"/>
+          </a:fontRef>
+        </p:style>
+      </p:cxnSp>
+      <p:cxnSp>
+        <p:nvCxnSpPr>
+          <p:cNvPr id="61" name="Straight Connector 60">
+            <a:extLst>
+              <a:ext uri="{FF2B5EF4-FFF2-40B4-BE49-F238E27FC236}">
+                <a16:creationId xmlns:a16="http://schemas.microsoft.com/office/drawing/2014/main" id="{C21C0E4A-376F-C14D-A951-4C40CB30CA38}"/>
+              </a:ext>
+            </a:extLst>
+          </p:cNvPr>
+          <p:cNvCxnSpPr>
+            <a:cxnSpLocks/>
+          </p:cNvCxnSpPr>
+          <p:nvPr/>
+        </p:nvCxnSpPr>
+        <p:spPr>
+          <a:xfrm flipH="1">
+            <a:off x="3811617" y="3608597"/>
+            <a:ext cx="136884" cy="0"/>
+          </a:xfrm>
+          <a:prstGeom prst="line">
+            <a:avLst/>
+          </a:prstGeom>
+          <a:ln w="28575">
+            <a:solidFill>
+              <a:schemeClr val="tx1"/>
+            </a:solidFill>
+          </a:ln>
+        </p:spPr>
+        <p:style>
+          <a:lnRef idx="1">
+            <a:schemeClr val="accent1"/>
+          </a:lnRef>
+          <a:fillRef idx="0">
+            <a:schemeClr val="accent1"/>
+          </a:fillRef>
+          <a:effectRef idx="0">
+            <a:schemeClr val="accent1"/>
+          </a:effectRef>
+          <a:fontRef idx="minor">
+            <a:schemeClr val="tx1"/>
+          </a:fontRef>
+        </p:style>
+      </p:cxnSp>
+      <p:cxnSp>
+        <p:nvCxnSpPr>
+          <p:cNvPr id="62" name="Straight Connector 61">
+            <a:extLst>
+              <a:ext uri="{FF2B5EF4-FFF2-40B4-BE49-F238E27FC236}">
+                <a16:creationId xmlns:a16="http://schemas.microsoft.com/office/drawing/2014/main" id="{8FA7AB24-37B7-C342-9D07-050E03E6D3E3}"/>
+              </a:ext>
+            </a:extLst>
+          </p:cNvPr>
+          <p:cNvCxnSpPr>
+            <a:cxnSpLocks/>
+          </p:cNvCxnSpPr>
+          <p:nvPr/>
+        </p:nvCxnSpPr>
+        <p:spPr>
+          <a:xfrm flipH="1">
+            <a:off x="3811617" y="3934901"/>
+            <a:ext cx="136884" cy="0"/>
+          </a:xfrm>
+          <a:prstGeom prst="line">
+            <a:avLst/>
+          </a:prstGeom>
+          <a:ln w="28575">
+            <a:solidFill>
+              <a:schemeClr val="tx1"/>
+            </a:solidFill>
+          </a:ln>
+        </p:spPr>
+        <p:style>
+          <a:lnRef idx="1">
+            <a:schemeClr val="accent1"/>
+          </a:lnRef>
+          <a:fillRef idx="0">
+            <a:schemeClr val="accent1"/>
+          </a:fillRef>
+          <a:effectRef idx="0">
+            <a:schemeClr val="accent1"/>
+          </a:effectRef>
+          <a:fontRef idx="minor">
+            <a:schemeClr val="tx1"/>
+          </a:fontRef>
+        </p:style>
+      </p:cxnSp>
+      <p:sp>
+        <p:nvSpPr>
+          <p:cNvPr id="63" name="TextBox 62">
+            <a:extLst>
+              <a:ext uri="{FF2B5EF4-FFF2-40B4-BE49-F238E27FC236}">
+                <a16:creationId xmlns:a16="http://schemas.microsoft.com/office/drawing/2014/main" id="{29CEF497-B501-344E-960F-6B574B8DB779}"/>
+              </a:ext>
+            </a:extLst>
+          </p:cNvPr>
+          <p:cNvSpPr txBox="1"/>
+          <p:nvPr/>
+        </p:nvSpPr>
+        <p:spPr>
+          <a:xfrm>
+            <a:off x="3293927" y="1823363"/>
+            <a:ext cx="710527" cy="338554"/>
+          </a:xfrm>
+          <a:prstGeom prst="rect">
+            <a:avLst/>
+          </a:prstGeom>
+          <a:noFill/>
+        </p:spPr>
+        <p:txBody>
+          <a:bodyPr wrap="square" rtlCol="0">
+            <a:spAutoFit/>
+          </a:bodyPr>
+          <a:lstStyle/>
+          <a:p>
+            <a:pPr algn="ctr"/>
+            <a:r>
+              <a:rPr lang="en-GB" sz="1600" b="1" dirty="0">
+                <a:latin typeface="CMU Serif Roman" charset="0"/>
+                <a:ea typeface="CMU Serif Roman" charset="0"/>
+                <a:cs typeface="CMU Serif Roman" charset="0"/>
+              </a:rPr>
+              <a:t>1</a:t>
+            </a:r>
+          </a:p>
+        </p:txBody>
+      </p:sp>
+      <p:sp>
+        <p:nvSpPr>
+          <p:cNvPr id="64" name="TextBox 63">
+            <a:extLst>
+              <a:ext uri="{FF2B5EF4-FFF2-40B4-BE49-F238E27FC236}">
+                <a16:creationId xmlns:a16="http://schemas.microsoft.com/office/drawing/2014/main" id="{CBA10207-78CB-0746-AD82-762728272FC6}"/>
+              </a:ext>
+            </a:extLst>
+          </p:cNvPr>
+          <p:cNvSpPr txBox="1"/>
+          <p:nvPr/>
+        </p:nvSpPr>
+        <p:spPr>
+          <a:xfrm>
+            <a:off x="3293927" y="2121248"/>
+            <a:ext cx="710527" cy="338554"/>
+          </a:xfrm>
+          <a:prstGeom prst="rect">
+            <a:avLst/>
+          </a:prstGeom>
+          <a:noFill/>
+        </p:spPr>
+        <p:txBody>
+          <a:bodyPr wrap="square" rtlCol="0">
+            <a:spAutoFit/>
+          </a:bodyPr>
+          <a:lstStyle/>
+          <a:p>
+            <a:pPr algn="ctr"/>
+            <a:r>
+              <a:rPr lang="en-GB" sz="1600" b="1" dirty="0">
+                <a:latin typeface="CMU Serif Roman" charset="0"/>
+                <a:ea typeface="CMU Serif Roman" charset="0"/>
+                <a:cs typeface="CMU Serif Roman" charset="0"/>
+              </a:rPr>
+              <a:t>2</a:t>
+            </a:r>
+          </a:p>
+        </p:txBody>
+      </p:sp>
+      <p:sp>
+        <p:nvSpPr>
+          <p:cNvPr id="65" name="TextBox 64">
+            <a:extLst>
+              <a:ext uri="{FF2B5EF4-FFF2-40B4-BE49-F238E27FC236}">
+                <a16:creationId xmlns:a16="http://schemas.microsoft.com/office/drawing/2014/main" id="{3A6794D9-840A-4E44-AF31-20F6C9DD7656}"/>
+              </a:ext>
+            </a:extLst>
+          </p:cNvPr>
+          <p:cNvSpPr txBox="1"/>
+          <p:nvPr/>
+        </p:nvSpPr>
+        <p:spPr>
+          <a:xfrm>
+            <a:off x="3293928" y="2450858"/>
+            <a:ext cx="710527" cy="338554"/>
+          </a:xfrm>
+          <a:prstGeom prst="rect">
+            <a:avLst/>
+          </a:prstGeom>
+          <a:noFill/>
+        </p:spPr>
+        <p:txBody>
+          <a:bodyPr wrap="square" rtlCol="0">
+            <a:spAutoFit/>
+          </a:bodyPr>
+          <a:lstStyle/>
+          <a:p>
+            <a:pPr algn="ctr"/>
+            <a:r>
+              <a:rPr lang="en-GB" sz="1600" b="1" dirty="0">
+                <a:latin typeface="CMU Serif Roman" charset="0"/>
+                <a:ea typeface="CMU Serif Roman" charset="0"/>
+                <a:cs typeface="CMU Serif Roman" charset="0"/>
+              </a:rPr>
+              <a:t>3</a:t>
+            </a:r>
+          </a:p>
+        </p:txBody>
+      </p:sp>
+      <p:sp>
+        <p:nvSpPr>
+          <p:cNvPr id="66" name="TextBox 65">
+            <a:extLst>
+              <a:ext uri="{FF2B5EF4-FFF2-40B4-BE49-F238E27FC236}">
+                <a16:creationId xmlns:a16="http://schemas.microsoft.com/office/drawing/2014/main" id="{16E84194-E4AC-CA45-AD22-B537B7C8BAAE}"/>
+              </a:ext>
+            </a:extLst>
+          </p:cNvPr>
+          <p:cNvSpPr txBox="1"/>
+          <p:nvPr/>
+        </p:nvSpPr>
+        <p:spPr>
+          <a:xfrm>
+            <a:off x="3289552" y="2783400"/>
+            <a:ext cx="710527" cy="338554"/>
+          </a:xfrm>
+          <a:prstGeom prst="rect">
+            <a:avLst/>
+          </a:prstGeom>
+          <a:noFill/>
+        </p:spPr>
+        <p:txBody>
+          <a:bodyPr wrap="square" rtlCol="0">
+            <a:spAutoFit/>
+          </a:bodyPr>
+          <a:lstStyle/>
+          <a:p>
+            <a:pPr algn="ctr"/>
+            <a:r>
+              <a:rPr lang="en-GB" sz="1600" b="1" dirty="0">
+                <a:latin typeface="CMU Serif Roman" charset="0"/>
+                <a:ea typeface="CMU Serif Roman" charset="0"/>
+                <a:cs typeface="CMU Serif Roman" charset="0"/>
+              </a:rPr>
+              <a:t>4</a:t>
+            </a:r>
+          </a:p>
+        </p:txBody>
+      </p:sp>
+      <p:sp>
+        <p:nvSpPr>
+          <p:cNvPr id="67" name="TextBox 66">
+            <a:extLst>
+              <a:ext uri="{FF2B5EF4-FFF2-40B4-BE49-F238E27FC236}">
+                <a16:creationId xmlns:a16="http://schemas.microsoft.com/office/drawing/2014/main" id="{1DA4AF34-6C72-B842-A6C7-5F840E4D47CB}"/>
+              </a:ext>
+            </a:extLst>
+          </p:cNvPr>
+          <p:cNvSpPr txBox="1"/>
+          <p:nvPr/>
+        </p:nvSpPr>
+        <p:spPr>
+          <a:xfrm>
+            <a:off x="3293927" y="3088166"/>
+            <a:ext cx="710527" cy="338554"/>
+          </a:xfrm>
+          <a:prstGeom prst="rect">
+            <a:avLst/>
+          </a:prstGeom>
+          <a:noFill/>
+        </p:spPr>
+        <p:txBody>
+          <a:bodyPr wrap="square" rtlCol="0">
+            <a:spAutoFit/>
+          </a:bodyPr>
+          <a:lstStyle/>
+          <a:p>
+            <a:pPr algn="ctr"/>
+            <a:r>
+              <a:rPr lang="en-GB" sz="1600" b="1" dirty="0">
+                <a:latin typeface="CMU Serif Roman" charset="0"/>
+                <a:ea typeface="CMU Serif Roman" charset="0"/>
+                <a:cs typeface="CMU Serif Roman" charset="0"/>
+              </a:rPr>
+              <a:t>5</a:t>
+            </a:r>
+          </a:p>
+        </p:txBody>
+      </p:sp>
+      <p:sp>
+        <p:nvSpPr>
+          <p:cNvPr id="68" name="TextBox 67">
+            <a:extLst>
+              <a:ext uri="{FF2B5EF4-FFF2-40B4-BE49-F238E27FC236}">
+                <a16:creationId xmlns:a16="http://schemas.microsoft.com/office/drawing/2014/main" id="{1E046C78-7930-EC43-BEAA-47FD860F54D6}"/>
+              </a:ext>
+            </a:extLst>
+          </p:cNvPr>
+          <p:cNvSpPr txBox="1"/>
+          <p:nvPr/>
+        </p:nvSpPr>
+        <p:spPr>
+          <a:xfrm>
+            <a:off x="3301166" y="3438375"/>
+            <a:ext cx="710527" cy="338554"/>
+          </a:xfrm>
+          <a:prstGeom prst="rect">
+            <a:avLst/>
+          </a:prstGeom>
+          <a:noFill/>
+        </p:spPr>
+        <p:txBody>
+          <a:bodyPr wrap="square" rtlCol="0">
+            <a:spAutoFit/>
+          </a:bodyPr>
+          <a:lstStyle/>
+          <a:p>
+            <a:pPr algn="ctr"/>
+            <a:r>
+              <a:rPr lang="en-GB" sz="1600" b="1" dirty="0">
+                <a:latin typeface="CMU Serif Roman" charset="0"/>
+                <a:ea typeface="CMU Serif Roman" charset="0"/>
+                <a:cs typeface="CMU Serif Roman" charset="0"/>
+              </a:rPr>
+              <a:t>6</a:t>
+            </a:r>
+          </a:p>
+        </p:txBody>
+      </p:sp>
+      <p:sp>
+        <p:nvSpPr>
+          <p:cNvPr id="69" name="TextBox 68">
+            <a:extLst>
+              <a:ext uri="{FF2B5EF4-FFF2-40B4-BE49-F238E27FC236}">
+                <a16:creationId xmlns:a16="http://schemas.microsoft.com/office/drawing/2014/main" id="{CB8B6FEC-989A-944A-A42D-DBFAA8302126}"/>
+              </a:ext>
+            </a:extLst>
+          </p:cNvPr>
+          <p:cNvSpPr txBox="1"/>
+          <p:nvPr/>
+        </p:nvSpPr>
+        <p:spPr>
+          <a:xfrm>
+            <a:off x="3301166" y="3764904"/>
+            <a:ext cx="710527" cy="338554"/>
+          </a:xfrm>
+          <a:prstGeom prst="rect">
+            <a:avLst/>
+          </a:prstGeom>
+          <a:noFill/>
+        </p:spPr>
+        <p:txBody>
+          <a:bodyPr wrap="square" rtlCol="0">
+            <a:spAutoFit/>
+          </a:bodyPr>
+          <a:lstStyle/>
+          <a:p>
+            <a:pPr algn="ctr"/>
+            <a:r>
+              <a:rPr lang="en-GB" sz="1600" b="1" dirty="0">
+                <a:latin typeface="CMU Serif Roman" charset="0"/>
+                <a:ea typeface="CMU Serif Roman" charset="0"/>
+                <a:cs typeface="CMU Serif Roman" charset="0"/>
+              </a:rPr>
+              <a:t>7</a:t>
+            </a:r>
+          </a:p>
+        </p:txBody>
+      </p:sp>
+      <p:sp>
+        <p:nvSpPr>
+          <p:cNvPr id="70" name="TextBox 69">
+            <a:extLst>
+              <a:ext uri="{FF2B5EF4-FFF2-40B4-BE49-F238E27FC236}">
+                <a16:creationId xmlns:a16="http://schemas.microsoft.com/office/drawing/2014/main" id="{78BC7AC2-A9A9-1E42-A409-D63B77588787}"/>
+              </a:ext>
+            </a:extLst>
+          </p:cNvPr>
+          <p:cNvSpPr txBox="1"/>
+          <p:nvPr/>
+        </p:nvSpPr>
+        <p:spPr>
+          <a:xfrm>
+            <a:off x="3301166" y="4105413"/>
+            <a:ext cx="710527" cy="338554"/>
+          </a:xfrm>
+          <a:prstGeom prst="rect">
+            <a:avLst/>
+          </a:prstGeom>
+          <a:noFill/>
+        </p:spPr>
+        <p:txBody>
+          <a:bodyPr wrap="square" rtlCol="0">
+            <a:spAutoFit/>
+          </a:bodyPr>
+          <a:lstStyle/>
+          <a:p>
+            <a:pPr algn="ctr"/>
+            <a:r>
+              <a:rPr lang="en-GB" sz="1600" b="1" dirty="0">
+                <a:latin typeface="CMU Serif Roman" charset="0"/>
+                <a:ea typeface="CMU Serif Roman" charset="0"/>
+                <a:cs typeface="CMU Serif Roman" charset="0"/>
+              </a:rPr>
+              <a:t>8</a:t>
+            </a:r>
+          </a:p>
+        </p:txBody>
+      </p:sp>
+      <p:sp>
+        <p:nvSpPr>
+          <p:cNvPr id="71" name="TextBox 70">
+            <a:extLst>
+              <a:ext uri="{FF2B5EF4-FFF2-40B4-BE49-F238E27FC236}">
+                <a16:creationId xmlns:a16="http://schemas.microsoft.com/office/drawing/2014/main" id="{80F25ED2-4B70-9B4D-978A-4FCC0C7A15E5}"/>
+              </a:ext>
+            </a:extLst>
+          </p:cNvPr>
+          <p:cNvSpPr txBox="1"/>
+          <p:nvPr/>
+        </p:nvSpPr>
+        <p:spPr>
+          <a:xfrm>
+            <a:off x="3301166" y="4427281"/>
+            <a:ext cx="710527" cy="338554"/>
+          </a:xfrm>
+          <a:prstGeom prst="rect">
+            <a:avLst/>
+          </a:prstGeom>
+          <a:noFill/>
+        </p:spPr>
+        <p:txBody>
+          <a:bodyPr wrap="square" rtlCol="0">
+            <a:spAutoFit/>
+          </a:bodyPr>
+          <a:lstStyle/>
+          <a:p>
+            <a:pPr algn="ctr"/>
+            <a:r>
+              <a:rPr lang="en-GB" sz="1600" b="1" dirty="0">
+                <a:latin typeface="CMU Serif Roman" charset="0"/>
+                <a:ea typeface="CMU Serif Roman" charset="0"/>
+                <a:cs typeface="CMU Serif Roman" charset="0"/>
+              </a:rPr>
+              <a:t>9</a:t>
+            </a:r>
+          </a:p>
+        </p:txBody>
+      </p:sp>
+      <p:sp>
+        <p:nvSpPr>
+          <p:cNvPr id="73" name="TextBox 72">
+            <a:extLst>
+              <a:ext uri="{FF2B5EF4-FFF2-40B4-BE49-F238E27FC236}">
+                <a16:creationId xmlns:a16="http://schemas.microsoft.com/office/drawing/2014/main" id="{D3DA62F6-D25D-BD42-8EB2-57CC46DD9785}"/>
+              </a:ext>
+            </a:extLst>
+          </p:cNvPr>
+          <p:cNvSpPr txBox="1"/>
+          <p:nvPr/>
+        </p:nvSpPr>
+        <p:spPr>
+          <a:xfrm>
+            <a:off x="8431793" y="4313637"/>
+            <a:ext cx="710527" cy="338554"/>
+          </a:xfrm>
+          <a:prstGeom prst="rect">
+            <a:avLst/>
+          </a:prstGeom>
+          <a:noFill/>
+        </p:spPr>
+        <p:txBody>
+          <a:bodyPr wrap="square" rtlCol="0">
+            <a:spAutoFit/>
+          </a:bodyPr>
+          <a:lstStyle/>
+          <a:p>
+            <a:pPr algn="ctr"/>
+            <a:r>
+              <a:rPr lang="en-GB" sz="1600" b="1" dirty="0">
+                <a:latin typeface="CMU Serif Roman" charset="0"/>
+                <a:ea typeface="CMU Serif Roman" charset="0"/>
+                <a:cs typeface="CMU Serif Roman" charset="0"/>
+              </a:rPr>
+              <a:t>-9.33</a:t>
+            </a:r>
+          </a:p>
+        </p:txBody>
+      </p:sp>
+      <p:sp>
+        <p:nvSpPr>
+          <p:cNvPr id="74" name="TextBox 73">
+            <a:extLst>
+              <a:ext uri="{FF2B5EF4-FFF2-40B4-BE49-F238E27FC236}">
+                <a16:creationId xmlns:a16="http://schemas.microsoft.com/office/drawing/2014/main" id="{BC7D3B19-9A39-CB44-A410-19DA0456D46D}"/>
+              </a:ext>
+            </a:extLst>
+          </p:cNvPr>
+          <p:cNvSpPr txBox="1"/>
+          <p:nvPr/>
+        </p:nvSpPr>
+        <p:spPr>
+          <a:xfrm>
+            <a:off x="8320014" y="3595627"/>
+            <a:ext cx="710527" cy="338554"/>
+          </a:xfrm>
+          <a:prstGeom prst="rect">
+            <a:avLst/>
+          </a:prstGeom>
+          <a:noFill/>
+        </p:spPr>
+        <p:txBody>
+          <a:bodyPr wrap="square" rtlCol="0">
+            <a:spAutoFit/>
+          </a:bodyPr>
+          <a:lstStyle/>
+          <a:p>
+            <a:pPr algn="ctr"/>
+            <a:r>
+              <a:rPr lang="en-GB" sz="1600" b="1" dirty="0">
+                <a:latin typeface="CMU Serif Roman" charset="0"/>
+                <a:ea typeface="CMU Serif Roman" charset="0"/>
+                <a:cs typeface="CMU Serif Roman" charset="0"/>
+              </a:rPr>
+              <a:t>-5</a:t>
+            </a:r>
+          </a:p>
+        </p:txBody>
+      </p:sp>
+      <p:sp>
+        <p:nvSpPr>
+          <p:cNvPr id="75" name="TextBox 74">
+            <a:extLst>
+              <a:ext uri="{FF2B5EF4-FFF2-40B4-BE49-F238E27FC236}">
+                <a16:creationId xmlns:a16="http://schemas.microsoft.com/office/drawing/2014/main" id="{2B99D13F-D010-7842-8A7D-2814DC4E31DB}"/>
+              </a:ext>
+            </a:extLst>
+          </p:cNvPr>
+          <p:cNvSpPr txBox="1"/>
+          <p:nvPr/>
+        </p:nvSpPr>
+        <p:spPr>
+          <a:xfrm>
+            <a:off x="8452341" y="2876094"/>
+            <a:ext cx="795260" cy="338554"/>
+          </a:xfrm>
+          <a:prstGeom prst="rect">
+            <a:avLst/>
+          </a:prstGeom>
+          <a:noFill/>
+        </p:spPr>
+        <p:txBody>
+          <a:bodyPr wrap="square" rtlCol="0">
+            <a:spAutoFit/>
+          </a:bodyPr>
+          <a:lstStyle/>
+          <a:p>
+            <a:pPr algn="ctr"/>
+            <a:r>
+              <a:rPr lang="en-GB" sz="1600" b="1" dirty="0">
+                <a:latin typeface="CMU Serif Roman" charset="0"/>
+                <a:ea typeface="CMU Serif Roman" charset="0"/>
+                <a:cs typeface="CMU Serif Roman" charset="0"/>
+              </a:rPr>
+              <a:t>-0.665</a:t>
+            </a:r>
+          </a:p>
+        </p:txBody>
+      </p:sp>
+      <p:sp>
+        <p:nvSpPr>
+          <p:cNvPr id="76" name="TextBox 75">
+            <a:extLst>
+              <a:ext uri="{FF2B5EF4-FFF2-40B4-BE49-F238E27FC236}">
+                <a16:creationId xmlns:a16="http://schemas.microsoft.com/office/drawing/2014/main" id="{121C9355-C506-C544-9E78-EF6B5800F940}"/>
+              </a:ext>
+            </a:extLst>
+          </p:cNvPr>
+          <p:cNvSpPr txBox="1"/>
+          <p:nvPr/>
+        </p:nvSpPr>
+        <p:spPr>
+          <a:xfrm>
+            <a:off x="8394068" y="2188380"/>
+            <a:ext cx="795260" cy="338554"/>
+          </a:xfrm>
+          <a:prstGeom prst="rect">
+            <a:avLst/>
+          </a:prstGeom>
+          <a:noFill/>
+        </p:spPr>
+        <p:txBody>
+          <a:bodyPr wrap="square" rtlCol="0">
+            <a:spAutoFit/>
+          </a:bodyPr>
+          <a:lstStyle/>
+          <a:p>
+            <a:pPr algn="ctr"/>
+            <a:r>
+              <a:rPr lang="en-GB" sz="1600" b="1" dirty="0">
+                <a:latin typeface="CMU Serif Roman" charset="0"/>
+                <a:ea typeface="CMU Serif Roman" charset="0"/>
+                <a:cs typeface="CMU Serif Roman" charset="0"/>
+              </a:rPr>
+              <a:t>3.67</a:t>
+            </a:r>
+          </a:p>
+        </p:txBody>
+      </p:sp>
+    </p:spTree>
+    <p:extLst>
+      <p:ext uri="{BB962C8B-B14F-4D97-AF65-F5344CB8AC3E}">
+        <p14:creationId xmlns:p14="http://schemas.microsoft.com/office/powerpoint/2010/main" val="2043856856"/>
       </p:ext>
     </p:extLst>
   </p:cSld>

</xml_diff>

<commit_message>
esc4: r: working on report
</commit_message>
<xml_diff>
--- a/earth_system_and_climate_4/term_1/practical_2/report/figures/diagrams.pptx
+++ b/earth_system_and_climate_4/term_1/practical_2/report/figures/diagrams.pptx
@@ -199,7 +199,7 @@
           <a:p>
             <a:fld id="{1D63773A-98AB-E940-87E9-7E718E4926FF}" type="datetimeFigureOut">
               <a:rPr lang="en-GB" smtClean="0"/>
-              <a:t>14/11/2018</a:t>
+              <a:t>18/11/2018</a:t>
             </a:fld>
             <a:endParaRPr lang="en-GB"/>
           </a:p>
@@ -682,7 +682,7 @@
           <a:p>
             <a:fld id="{36593596-8FBE-7A4B-8A4D-8A890AC13AF4}" type="datetimeFigureOut">
               <a:rPr lang="en-GB" smtClean="0"/>
-              <a:t>14/11/2018</a:t>
+              <a:t>18/11/2018</a:t>
             </a:fld>
             <a:endParaRPr lang="en-GB"/>
           </a:p>
@@ -852,7 +852,7 @@
           <a:p>
             <a:fld id="{36593596-8FBE-7A4B-8A4D-8A890AC13AF4}" type="datetimeFigureOut">
               <a:rPr lang="en-GB" smtClean="0"/>
-              <a:t>14/11/2018</a:t>
+              <a:t>18/11/2018</a:t>
             </a:fld>
             <a:endParaRPr lang="en-GB"/>
           </a:p>
@@ -1032,7 +1032,7 @@
           <a:p>
             <a:fld id="{36593596-8FBE-7A4B-8A4D-8A890AC13AF4}" type="datetimeFigureOut">
               <a:rPr lang="en-GB" smtClean="0"/>
-              <a:t>14/11/2018</a:t>
+              <a:t>18/11/2018</a:t>
             </a:fld>
             <a:endParaRPr lang="en-GB"/>
           </a:p>
@@ -1202,7 +1202,7 @@
           <a:p>
             <a:fld id="{36593596-8FBE-7A4B-8A4D-8A890AC13AF4}" type="datetimeFigureOut">
               <a:rPr lang="en-GB" smtClean="0"/>
-              <a:t>14/11/2018</a:t>
+              <a:t>18/11/2018</a:t>
             </a:fld>
             <a:endParaRPr lang="en-GB"/>
           </a:p>
@@ -1448,7 +1448,7 @@
           <a:p>
             <a:fld id="{36593596-8FBE-7A4B-8A4D-8A890AC13AF4}" type="datetimeFigureOut">
               <a:rPr lang="en-GB" smtClean="0"/>
-              <a:t>14/11/2018</a:t>
+              <a:t>18/11/2018</a:t>
             </a:fld>
             <a:endParaRPr lang="en-GB"/>
           </a:p>
@@ -1680,7 +1680,7 @@
           <a:p>
             <a:fld id="{36593596-8FBE-7A4B-8A4D-8A890AC13AF4}" type="datetimeFigureOut">
               <a:rPr lang="en-GB" smtClean="0"/>
-              <a:t>14/11/2018</a:t>
+              <a:t>18/11/2018</a:t>
             </a:fld>
             <a:endParaRPr lang="en-GB"/>
           </a:p>
@@ -2047,7 +2047,7 @@
           <a:p>
             <a:fld id="{36593596-8FBE-7A4B-8A4D-8A890AC13AF4}" type="datetimeFigureOut">
               <a:rPr lang="en-GB" smtClean="0"/>
-              <a:t>14/11/2018</a:t>
+              <a:t>18/11/2018</a:t>
             </a:fld>
             <a:endParaRPr lang="en-GB"/>
           </a:p>
@@ -2165,7 +2165,7 @@
           <a:p>
             <a:fld id="{36593596-8FBE-7A4B-8A4D-8A890AC13AF4}" type="datetimeFigureOut">
               <a:rPr lang="en-GB" smtClean="0"/>
-              <a:t>14/11/2018</a:t>
+              <a:t>18/11/2018</a:t>
             </a:fld>
             <a:endParaRPr lang="en-GB"/>
           </a:p>
@@ -2260,7 +2260,7 @@
           <a:p>
             <a:fld id="{36593596-8FBE-7A4B-8A4D-8A890AC13AF4}" type="datetimeFigureOut">
               <a:rPr lang="en-GB" smtClean="0"/>
-              <a:t>14/11/2018</a:t>
+              <a:t>18/11/2018</a:t>
             </a:fld>
             <a:endParaRPr lang="en-GB"/>
           </a:p>
@@ -2537,7 +2537,7 @@
           <a:p>
             <a:fld id="{36593596-8FBE-7A4B-8A4D-8A890AC13AF4}" type="datetimeFigureOut">
               <a:rPr lang="en-GB" smtClean="0"/>
-              <a:t>14/11/2018</a:t>
+              <a:t>18/11/2018</a:t>
             </a:fld>
             <a:endParaRPr lang="en-GB"/>
           </a:p>
@@ -2790,7 +2790,7 @@
           <a:p>
             <a:fld id="{36593596-8FBE-7A4B-8A4D-8A890AC13AF4}" type="datetimeFigureOut">
               <a:rPr lang="en-GB" smtClean="0"/>
-              <a:t>14/11/2018</a:t>
+              <a:t>18/11/2018</a:t>
             </a:fld>
             <a:endParaRPr lang="en-GB"/>
           </a:p>
@@ -3003,7 +3003,7 @@
           <a:p>
             <a:fld id="{36593596-8FBE-7A4B-8A4D-8A890AC13AF4}" type="datetimeFigureOut">
               <a:rPr lang="en-GB" smtClean="0"/>
-              <a:t>14/11/2018</a:t>
+              <a:t>18/11/2018</a:t>
             </a:fld>
             <a:endParaRPr lang="en-GB"/>
           </a:p>
@@ -6955,6 +6955,50 @@
           </a:fontRef>
         </p:style>
       </p:cxnSp>
+      <p:cxnSp>
+        <p:nvCxnSpPr>
+          <p:cNvPr id="105" name="Straight Connector 104">
+            <a:extLst>
+              <a:ext uri="{FF2B5EF4-FFF2-40B4-BE49-F238E27FC236}">
+                <a16:creationId xmlns:a16="http://schemas.microsoft.com/office/drawing/2014/main" id="{6AF75597-51B8-E746-ADF3-8DBF56697EAB}"/>
+              </a:ext>
+            </a:extLst>
+          </p:cNvPr>
+          <p:cNvCxnSpPr>
+            <a:cxnSpLocks/>
+          </p:cNvCxnSpPr>
+          <p:nvPr/>
+        </p:nvCxnSpPr>
+        <p:spPr>
+          <a:xfrm flipH="1">
+            <a:off x="1041532" y="4480294"/>
+            <a:ext cx="2952952" cy="0"/>
+          </a:xfrm>
+          <a:prstGeom prst="line">
+            <a:avLst/>
+          </a:prstGeom>
+          <a:ln w="34925">
+            <a:solidFill>
+              <a:schemeClr val="bg1"/>
+            </a:solidFill>
+            <a:prstDash val="dash"/>
+          </a:ln>
+        </p:spPr>
+        <p:style>
+          <a:lnRef idx="1">
+            <a:schemeClr val="accent1"/>
+          </a:lnRef>
+          <a:fillRef idx="0">
+            <a:schemeClr val="accent1"/>
+          </a:fillRef>
+          <a:effectRef idx="0">
+            <a:schemeClr val="accent1"/>
+          </a:effectRef>
+          <a:fontRef idx="minor">
+            <a:schemeClr val="tx1"/>
+          </a:fontRef>
+        </p:style>
+      </p:cxnSp>
     </p:spTree>
     <p:extLst>
       <p:ext uri="{BB962C8B-B14F-4D97-AF65-F5344CB8AC3E}">
@@ -7030,8 +7074,8 @@
         </p:nvCxnSpPr>
         <p:spPr>
           <a:xfrm flipH="1">
-            <a:off x="3944768" y="4226916"/>
-            <a:ext cx="4302463" cy="0"/>
+            <a:off x="7480745" y="4313637"/>
+            <a:ext cx="766487" cy="0"/>
           </a:xfrm>
           <a:prstGeom prst="line">
             <a:avLst/>
@@ -8909,6 +8953,140 @@
           </a:p>
         </p:txBody>
       </p:sp>
+      <p:cxnSp>
+        <p:nvCxnSpPr>
+          <p:cNvPr id="50" name="Straight Connector 49">
+            <a:extLst>
+              <a:ext uri="{FF2B5EF4-FFF2-40B4-BE49-F238E27FC236}">
+                <a16:creationId xmlns:a16="http://schemas.microsoft.com/office/drawing/2014/main" id="{9FE0952D-0253-9946-940E-6A997B8D4A9B}"/>
+              </a:ext>
+            </a:extLst>
+          </p:cNvPr>
+          <p:cNvCxnSpPr>
+            <a:cxnSpLocks/>
+          </p:cNvCxnSpPr>
+          <p:nvPr/>
+        </p:nvCxnSpPr>
+        <p:spPr>
+          <a:xfrm flipH="1">
+            <a:off x="3811617" y="3696279"/>
+            <a:ext cx="786419" cy="0"/>
+          </a:xfrm>
+          <a:prstGeom prst="line">
+            <a:avLst/>
+          </a:prstGeom>
+          <a:ln w="34925">
+            <a:solidFill>
+              <a:schemeClr val="bg1"/>
+            </a:solidFill>
+            <a:prstDash val="dash"/>
+          </a:ln>
+        </p:spPr>
+        <p:style>
+          <a:lnRef idx="1">
+            <a:schemeClr val="accent1"/>
+          </a:lnRef>
+          <a:fillRef idx="0">
+            <a:schemeClr val="accent1"/>
+          </a:fillRef>
+          <a:effectRef idx="0">
+            <a:schemeClr val="accent1"/>
+          </a:effectRef>
+          <a:fontRef idx="minor">
+            <a:schemeClr val="tx1"/>
+          </a:fontRef>
+        </p:style>
+      </p:cxnSp>
+      <p:cxnSp>
+        <p:nvCxnSpPr>
+          <p:cNvPr id="51" name="Straight Connector 50">
+            <a:extLst>
+              <a:ext uri="{FF2B5EF4-FFF2-40B4-BE49-F238E27FC236}">
+                <a16:creationId xmlns:a16="http://schemas.microsoft.com/office/drawing/2014/main" id="{5A9F2FEB-531A-9A42-8FDB-84A192D9EB2C}"/>
+              </a:ext>
+            </a:extLst>
+          </p:cNvPr>
+          <p:cNvCxnSpPr>
+            <a:cxnSpLocks/>
+          </p:cNvCxnSpPr>
+          <p:nvPr/>
+        </p:nvCxnSpPr>
+        <p:spPr>
+          <a:xfrm flipH="1">
+            <a:off x="3944768" y="4493253"/>
+            <a:ext cx="4302463" cy="0"/>
+          </a:xfrm>
+          <a:prstGeom prst="line">
+            <a:avLst/>
+          </a:prstGeom>
+          <a:ln w="34925">
+            <a:solidFill>
+              <a:schemeClr val="bg1"/>
+            </a:solidFill>
+            <a:prstDash val="dash"/>
+          </a:ln>
+        </p:spPr>
+        <p:style>
+          <a:lnRef idx="1">
+            <a:schemeClr val="accent1"/>
+          </a:lnRef>
+          <a:fillRef idx="0">
+            <a:schemeClr val="accent1"/>
+          </a:fillRef>
+          <a:effectRef idx="0">
+            <a:schemeClr val="accent1"/>
+          </a:effectRef>
+          <a:fontRef idx="minor">
+            <a:schemeClr val="tx1"/>
+          </a:fontRef>
+        </p:style>
+      </p:cxnSp>
+      <p:cxnSp>
+        <p:nvCxnSpPr>
+          <p:cNvPr id="72" name="Straight Connector 71">
+            <a:extLst>
+              <a:ext uri="{FF2B5EF4-FFF2-40B4-BE49-F238E27FC236}">
+                <a16:creationId xmlns:a16="http://schemas.microsoft.com/office/drawing/2014/main" id="{B1849156-36EA-A94B-95E3-086EDFFABAC7}"/>
+              </a:ext>
+            </a:extLst>
+          </p:cNvPr>
+          <p:cNvCxnSpPr>
+            <a:cxnSpLocks/>
+          </p:cNvCxnSpPr>
+          <p:nvPr/>
+        </p:nvCxnSpPr>
+        <p:spPr>
+          <a:xfrm flipH="1">
+            <a:off x="3944607" y="4313637"/>
+            <a:ext cx="3523613" cy="0"/>
+          </a:xfrm>
+          <a:prstGeom prst="line">
+            <a:avLst/>
+          </a:prstGeom>
+          <a:ln w="34925">
+            <a:solidFill>
+              <a:schemeClr val="bg1">
+                <a:alpha val="50000"/>
+              </a:schemeClr>
+            </a:solidFill>
+            <a:prstDash val="dash"/>
+          </a:ln>
+        </p:spPr>
+        <p:style>
+          <a:lnRef idx="1">
+            <a:schemeClr val="accent1"/>
+          </a:lnRef>
+          <a:fillRef idx="0">
+            <a:schemeClr val="accent1"/>
+          </a:fillRef>
+          <a:effectRef idx="0">
+            <a:schemeClr val="accent1"/>
+          </a:effectRef>
+          <a:fontRef idx="minor">
+            <a:schemeClr val="tx1"/>
+          </a:fontRef>
+        </p:style>
+      </p:cxnSp>
     </p:spTree>
     <p:extLst>
       <p:ext uri="{BB962C8B-B14F-4D97-AF65-F5344CB8AC3E}">

</xml_diff>

<commit_message>
esc4: r: improved report plots to make more sense
</commit_message>
<xml_diff>
--- a/earth_system_and_climate_4/term_1/practical_2/report/figures/diagrams.pptx
+++ b/earth_system_and_climate_4/term_1/practical_2/report/figures/diagrams.pptx
@@ -199,7 +199,7 @@
           <a:p>
             <a:fld id="{1D63773A-98AB-E940-87E9-7E718E4926FF}" type="datetimeFigureOut">
               <a:rPr lang="en-GB" smtClean="0"/>
-              <a:t>18/11/2018</a:t>
+              <a:t>03/12/2018</a:t>
             </a:fld>
             <a:endParaRPr lang="en-GB"/>
           </a:p>
@@ -551,6 +551,90 @@
 </p:notes>
 </file>
 
+<file path=ppt/notesSlides/notesSlide2.xml><?xml version="1.0" encoding="utf-8"?>
+<p:notes xmlns:a="http://schemas.openxmlformats.org/drawingml/2006/main" xmlns:r="http://schemas.openxmlformats.org/officeDocument/2006/relationships" xmlns:p="http://schemas.openxmlformats.org/presentationml/2006/main">
+  <p:cSld>
+    <p:spTree>
+      <p:nvGrpSpPr>
+        <p:cNvPr id="1" name=""/>
+        <p:cNvGrpSpPr/>
+        <p:nvPr/>
+      </p:nvGrpSpPr>
+      <p:grpSpPr>
+        <a:xfrm>
+          <a:off x="0" y="0"/>
+          <a:ext cx="0" cy="0"/>
+          <a:chOff x="0" y="0"/>
+          <a:chExt cx="0" cy="0"/>
+        </a:xfrm>
+      </p:grpSpPr>
+      <p:sp>
+        <p:nvSpPr>
+          <p:cNvPr id="2" name="Slide Image Placeholder 1"/>
+          <p:cNvSpPr>
+            <a:spLocks noGrp="1" noRot="1" noChangeAspect="1"/>
+          </p:cNvSpPr>
+          <p:nvPr>
+            <p:ph type="sldImg"/>
+          </p:nvPr>
+        </p:nvSpPr>
+        <p:spPr/>
+      </p:sp>
+      <p:sp>
+        <p:nvSpPr>
+          <p:cNvPr id="3" name="Notes Placeholder 2"/>
+          <p:cNvSpPr>
+            <a:spLocks noGrp="1"/>
+          </p:cNvSpPr>
+          <p:nvPr>
+            <p:ph type="body" idx="1"/>
+          </p:nvPr>
+        </p:nvSpPr>
+        <p:spPr/>
+        <p:txBody>
+          <a:bodyPr/>
+          <a:lstStyle/>
+          <a:p>
+            <a:endParaRPr lang="en-GB" dirty="0"/>
+          </a:p>
+        </p:txBody>
+      </p:sp>
+      <p:sp>
+        <p:nvSpPr>
+          <p:cNvPr id="4" name="Slide Number Placeholder 3"/>
+          <p:cNvSpPr>
+            <a:spLocks noGrp="1"/>
+          </p:cNvSpPr>
+          <p:nvPr>
+            <p:ph type="sldNum" sz="quarter" idx="5"/>
+          </p:nvPr>
+        </p:nvSpPr>
+        <p:spPr/>
+        <p:txBody>
+          <a:bodyPr/>
+          <a:lstStyle/>
+          <a:p>
+            <a:fld id="{A2F3A15F-3103-684F-A89E-89DECA5CEF35}" type="slidenum">
+              <a:rPr lang="en-GB" smtClean="0"/>
+              <a:t>2</a:t>
+            </a:fld>
+            <a:endParaRPr lang="en-GB"/>
+          </a:p>
+        </p:txBody>
+      </p:sp>
+    </p:spTree>
+    <p:extLst>
+      <p:ext uri="{BB962C8B-B14F-4D97-AF65-F5344CB8AC3E}">
+        <p14:creationId xmlns:p14="http://schemas.microsoft.com/office/powerpoint/2010/main" val="3946661808"/>
+      </p:ext>
+    </p:extLst>
+  </p:cSld>
+  <p:clrMapOvr>
+    <a:masterClrMapping/>
+  </p:clrMapOvr>
+</p:notes>
+</file>
+
 <file path=ppt/slideLayouts/slideLayout1.xml><?xml version="1.0" encoding="utf-8"?>
 <p:sldLayout xmlns:a="http://schemas.openxmlformats.org/drawingml/2006/main" xmlns:r="http://schemas.openxmlformats.org/officeDocument/2006/relationships" xmlns:p="http://schemas.openxmlformats.org/presentationml/2006/main" type="title" preserve="1">
   <p:cSld name="Title Slide">
@@ -682,7 +766,7 @@
           <a:p>
             <a:fld id="{36593596-8FBE-7A4B-8A4D-8A890AC13AF4}" type="datetimeFigureOut">
               <a:rPr lang="en-GB" smtClean="0"/>
-              <a:t>18/11/2018</a:t>
+              <a:t>03/12/2018</a:t>
             </a:fld>
             <a:endParaRPr lang="en-GB"/>
           </a:p>
@@ -852,7 +936,7 @@
           <a:p>
             <a:fld id="{36593596-8FBE-7A4B-8A4D-8A890AC13AF4}" type="datetimeFigureOut">
               <a:rPr lang="en-GB" smtClean="0"/>
-              <a:t>18/11/2018</a:t>
+              <a:t>03/12/2018</a:t>
             </a:fld>
             <a:endParaRPr lang="en-GB"/>
           </a:p>
@@ -1032,7 +1116,7 @@
           <a:p>
             <a:fld id="{36593596-8FBE-7A4B-8A4D-8A890AC13AF4}" type="datetimeFigureOut">
               <a:rPr lang="en-GB" smtClean="0"/>
-              <a:t>18/11/2018</a:t>
+              <a:t>03/12/2018</a:t>
             </a:fld>
             <a:endParaRPr lang="en-GB"/>
           </a:p>
@@ -1202,7 +1286,7 @@
           <a:p>
             <a:fld id="{36593596-8FBE-7A4B-8A4D-8A890AC13AF4}" type="datetimeFigureOut">
               <a:rPr lang="en-GB" smtClean="0"/>
-              <a:t>18/11/2018</a:t>
+              <a:t>03/12/2018</a:t>
             </a:fld>
             <a:endParaRPr lang="en-GB"/>
           </a:p>
@@ -1448,7 +1532,7 @@
           <a:p>
             <a:fld id="{36593596-8FBE-7A4B-8A4D-8A890AC13AF4}" type="datetimeFigureOut">
               <a:rPr lang="en-GB" smtClean="0"/>
-              <a:t>18/11/2018</a:t>
+              <a:t>03/12/2018</a:t>
             </a:fld>
             <a:endParaRPr lang="en-GB"/>
           </a:p>
@@ -1680,7 +1764,7 @@
           <a:p>
             <a:fld id="{36593596-8FBE-7A4B-8A4D-8A890AC13AF4}" type="datetimeFigureOut">
               <a:rPr lang="en-GB" smtClean="0"/>
-              <a:t>18/11/2018</a:t>
+              <a:t>03/12/2018</a:t>
             </a:fld>
             <a:endParaRPr lang="en-GB"/>
           </a:p>
@@ -2047,7 +2131,7 @@
           <a:p>
             <a:fld id="{36593596-8FBE-7A4B-8A4D-8A890AC13AF4}" type="datetimeFigureOut">
               <a:rPr lang="en-GB" smtClean="0"/>
-              <a:t>18/11/2018</a:t>
+              <a:t>03/12/2018</a:t>
             </a:fld>
             <a:endParaRPr lang="en-GB"/>
           </a:p>
@@ -2165,7 +2249,7 @@
           <a:p>
             <a:fld id="{36593596-8FBE-7A4B-8A4D-8A890AC13AF4}" type="datetimeFigureOut">
               <a:rPr lang="en-GB" smtClean="0"/>
-              <a:t>18/11/2018</a:t>
+              <a:t>03/12/2018</a:t>
             </a:fld>
             <a:endParaRPr lang="en-GB"/>
           </a:p>
@@ -2260,7 +2344,7 @@
           <a:p>
             <a:fld id="{36593596-8FBE-7A4B-8A4D-8A890AC13AF4}" type="datetimeFigureOut">
               <a:rPr lang="en-GB" smtClean="0"/>
-              <a:t>18/11/2018</a:t>
+              <a:t>03/12/2018</a:t>
             </a:fld>
             <a:endParaRPr lang="en-GB"/>
           </a:p>
@@ -2537,7 +2621,7 @@
           <a:p>
             <a:fld id="{36593596-8FBE-7A4B-8A4D-8A890AC13AF4}" type="datetimeFigureOut">
               <a:rPr lang="en-GB" smtClean="0"/>
-              <a:t>18/11/2018</a:t>
+              <a:t>03/12/2018</a:t>
             </a:fld>
             <a:endParaRPr lang="en-GB"/>
           </a:p>
@@ -2790,7 +2874,7 @@
           <a:p>
             <a:fld id="{36593596-8FBE-7A4B-8A4D-8A890AC13AF4}" type="datetimeFigureOut">
               <a:rPr lang="en-GB" smtClean="0"/>
-              <a:t>18/11/2018</a:t>
+              <a:t>03/12/2018</a:t>
             </a:fld>
             <a:endParaRPr lang="en-GB"/>
           </a:p>
@@ -3003,7 +3087,7 @@
           <a:p>
             <a:fld id="{36593596-8FBE-7A4B-8A4D-8A890AC13AF4}" type="datetimeFigureOut">
               <a:rPr lang="en-GB" smtClean="0"/>
-              <a:t>18/11/2018</a:t>
+              <a:t>03/12/2018</a:t>
             </a:fld>
             <a:endParaRPr lang="en-GB"/>
           </a:p>
@@ -3728,7 +3812,7 @@
           <p:nvPr/>
         </p:nvPicPr>
         <p:blipFill rotWithShape="1">
-          <a:blip r:embed="rId2"/>
+          <a:blip r:embed="rId3"/>
           <a:srcRect l="7171" t="9557" r="7587" b="10084"/>
           <a:stretch/>
         </p:blipFill>
@@ -3757,7 +3841,7 @@
           <p:nvPr/>
         </p:nvPicPr>
         <p:blipFill rotWithShape="1">
-          <a:blip r:embed="rId3"/>
+          <a:blip r:embed="rId4"/>
           <a:srcRect l="7423" t="9796" r="7542" b="9844"/>
           <a:stretch/>
         </p:blipFill>
@@ -3786,7 +3870,7 @@
           <p:nvPr/>
         </p:nvPicPr>
         <p:blipFill rotWithShape="1">
-          <a:blip r:embed="rId4"/>
+          <a:blip r:embed="rId5"/>
           <a:srcRect l="6907" t="9880" r="7310" b="9760"/>
           <a:stretch/>
         </p:blipFill>
@@ -4155,7 +4239,7 @@
                 <a:ea typeface="CMU Serif Roman" charset="0"/>
                 <a:cs typeface="CMU Serif Roman" charset="0"/>
               </a:rPr>
-              <a:t>1.5</a:t>
+              <a:t>2.8</a:t>
             </a:r>
           </a:p>
         </p:txBody>
@@ -4453,7 +4537,7 @@
                 <a:ea typeface="CMU Serif Roman" charset="0"/>
                 <a:cs typeface="CMU Serif Roman" charset="0"/>
               </a:rPr>
-              <a:t>3.0</a:t>
+              <a:t>8.0</a:t>
             </a:r>
           </a:p>
         </p:txBody>
@@ -4472,7 +4556,7 @@
         </p:nvSpPr>
         <p:spPr>
           <a:xfrm>
-            <a:off x="366492" y="2752653"/>
+            <a:off x="329550" y="2766289"/>
             <a:ext cx="744635" cy="338554"/>
           </a:xfrm>
           <a:prstGeom prst="rect">
@@ -4493,7 +4577,7 @@
                 <a:ea typeface="CMU Serif Roman" charset="0"/>
                 <a:cs typeface="CMU Serif Roman" charset="0"/>
               </a:rPr>
-              <a:t>4.5</a:t>
+              <a:t>22.6</a:t>
             </a:r>
           </a:p>
         </p:txBody>
@@ -4512,7 +4596,7 @@
         </p:nvSpPr>
         <p:spPr>
           <a:xfrm>
-            <a:off x="366491" y="3190057"/>
+            <a:off x="329549" y="3204496"/>
             <a:ext cx="744635" cy="338554"/>
           </a:xfrm>
           <a:prstGeom prst="rect">
@@ -4533,7 +4617,7 @@
                 <a:ea typeface="CMU Serif Roman" charset="0"/>
                 <a:cs typeface="CMU Serif Roman" charset="0"/>
               </a:rPr>
-              <a:t>6.0</a:t>
+              <a:t>64.0</a:t>
             </a:r>
           </a:p>
         </p:txBody>
@@ -4552,7 +4636,7 @@
         </p:nvSpPr>
         <p:spPr>
           <a:xfrm>
-            <a:off x="359403" y="3643870"/>
+            <a:off x="307406" y="3656274"/>
             <a:ext cx="744635" cy="338554"/>
           </a:xfrm>
           <a:prstGeom prst="rect">
@@ -4573,7 +4657,7 @@
                 <a:ea typeface="CMU Serif Roman" charset="0"/>
                 <a:cs typeface="CMU Serif Roman" charset="0"/>
               </a:rPr>
-              <a:t>7.5</a:t>
+              <a:t>181.0</a:t>
             </a:r>
           </a:p>
         </p:txBody>
@@ -4592,7 +4676,7 @@
         </p:nvSpPr>
         <p:spPr>
           <a:xfrm>
-            <a:off x="366490" y="4097683"/>
+            <a:off x="315271" y="4108052"/>
             <a:ext cx="744635" cy="338554"/>
           </a:xfrm>
           <a:prstGeom prst="rect">
@@ -4613,7 +4697,7 @@
                 <a:ea typeface="CMU Serif Roman" charset="0"/>
                 <a:cs typeface="CMU Serif Roman" charset="0"/>
               </a:rPr>
-              <a:t>9.0</a:t>
+              <a:t>512.0</a:t>
             </a:r>
           </a:p>
         </p:txBody>
@@ -4632,8 +4716,8 @@
         </p:nvSpPr>
         <p:spPr>
           <a:xfrm>
-            <a:off x="335530" y="4551496"/>
-            <a:ext cx="744635" cy="338554"/>
+            <a:off x="223297" y="4552205"/>
+            <a:ext cx="863660" cy="338554"/>
           </a:xfrm>
           <a:prstGeom prst="rect">
             <a:avLst/>
@@ -4653,7 +4737,7 @@
                 <a:ea typeface="CMU Serif Roman" charset="0"/>
                 <a:cs typeface="CMU Serif Roman" charset="0"/>
               </a:rPr>
-              <a:t>10.5</a:t>
+              <a:t>1448.2</a:t>
             </a:r>
           </a:p>
         </p:txBody>
@@ -4672,8 +4756,8 @@
         </p:nvSpPr>
         <p:spPr>
           <a:xfrm rot="16200000">
-            <a:off x="-419399" y="3190057"/>
-            <a:ext cx="1690657" cy="338554"/>
+            <a:off x="-1388137" y="3247367"/>
+            <a:ext cx="3061542" cy="338554"/>
           </a:xfrm>
           <a:prstGeom prst="rect">
             <a:avLst/>
@@ -4693,7 +4777,7 @@
                 <a:ea typeface="CMU Serif Roman" charset="0"/>
                 <a:cs typeface="CMU Serif Roman" charset="0"/>
               </a:rPr>
-              <a:t>log2 scale</a:t>
+              <a:t>Periodicity Wavelength (ka)</a:t>
             </a:r>
           </a:p>
         </p:txBody>
@@ -5114,7 +5198,7 @@
                     <a:ea typeface="CMU Serif Roman" charset="0"/>
                     <a:cs typeface="CMU Serif Roman" charset="0"/>
                   </a:rPr>
-                  <a:t>750</a:t>
+                  <a:t>0.75</a:t>
                 </a:r>
               </a:p>
             </p:txBody>
@@ -5154,7 +5238,7 @@
                     <a:ea typeface="CMU Serif Roman" charset="0"/>
                     <a:cs typeface="CMU Serif Roman" charset="0"/>
                   </a:rPr>
-                  <a:t>1500</a:t>
+                  <a:t>1.50</a:t>
                 </a:r>
               </a:p>
             </p:txBody>
@@ -5194,7 +5278,7 @@
                     <a:ea typeface="CMU Serif Roman" charset="0"/>
                     <a:cs typeface="CMU Serif Roman" charset="0"/>
                   </a:rPr>
-                  <a:t>2250</a:t>
+                  <a:t>2.25</a:t>
                 </a:r>
               </a:p>
             </p:txBody>
@@ -5234,7 +5318,7 @@
                     <a:ea typeface="CMU Serif Roman" charset="0"/>
                     <a:cs typeface="CMU Serif Roman" charset="0"/>
                   </a:rPr>
-                  <a:t>3000</a:t>
+                  <a:t>3.00</a:t>
                 </a:r>
               </a:p>
             </p:txBody>
@@ -5274,7 +5358,7 @@
                     <a:ea typeface="CMU Serif Roman" charset="0"/>
                     <a:cs typeface="CMU Serif Roman" charset="0"/>
                   </a:rPr>
-                  <a:t>3750</a:t>
+                  <a:t>3.75</a:t>
                 </a:r>
               </a:p>
             </p:txBody>
@@ -5314,7 +5398,7 @@
                     <a:ea typeface="CMU Serif Roman" charset="0"/>
                     <a:cs typeface="CMU Serif Roman" charset="0"/>
                   </a:rPr>
-                  <a:t>4500</a:t>
+                  <a:t>4.50</a:t>
                 </a:r>
               </a:p>
             </p:txBody>
@@ -5737,7 +5821,7 @@
                     <a:ea typeface="CMU Serif Roman" charset="0"/>
                     <a:cs typeface="CMU Serif Roman" charset="0"/>
                   </a:rPr>
-                  <a:t>750</a:t>
+                  <a:t>0.75</a:t>
                 </a:r>
               </a:p>
             </p:txBody>
@@ -5777,7 +5861,7 @@
                     <a:ea typeface="CMU Serif Roman" charset="0"/>
                     <a:cs typeface="CMU Serif Roman" charset="0"/>
                   </a:rPr>
-                  <a:t>1500</a:t>
+                  <a:t>1.50</a:t>
                 </a:r>
               </a:p>
             </p:txBody>
@@ -5817,7 +5901,7 @@
                     <a:ea typeface="CMU Serif Roman" charset="0"/>
                     <a:cs typeface="CMU Serif Roman" charset="0"/>
                   </a:rPr>
-                  <a:t>2250</a:t>
+                  <a:t>2.25</a:t>
                 </a:r>
               </a:p>
             </p:txBody>
@@ -5857,7 +5941,7 @@
                     <a:ea typeface="CMU Serif Roman" charset="0"/>
                     <a:cs typeface="CMU Serif Roman" charset="0"/>
                   </a:rPr>
-                  <a:t>3000</a:t>
+                  <a:t>3.00</a:t>
                 </a:r>
               </a:p>
             </p:txBody>
@@ -5897,7 +5981,7 @@
                     <a:ea typeface="CMU Serif Roman" charset="0"/>
                     <a:cs typeface="CMU Serif Roman" charset="0"/>
                   </a:rPr>
-                  <a:t>3750</a:t>
+                  <a:t>3.75</a:t>
                 </a:r>
               </a:p>
             </p:txBody>
@@ -5937,7 +6021,7 @@
                     <a:ea typeface="CMU Serif Roman" charset="0"/>
                     <a:cs typeface="CMU Serif Roman" charset="0"/>
                   </a:rPr>
-                  <a:t>4500</a:t>
+                  <a:t>4.50</a:t>
                 </a:r>
               </a:p>
             </p:txBody>
@@ -6360,7 +6444,7 @@
                     <a:ea typeface="CMU Serif Roman" charset="0"/>
                     <a:cs typeface="CMU Serif Roman" charset="0"/>
                   </a:rPr>
-                  <a:t>750</a:t>
+                  <a:t>0.75</a:t>
                 </a:r>
               </a:p>
             </p:txBody>
@@ -6400,7 +6484,7 @@
                     <a:ea typeface="CMU Serif Roman" charset="0"/>
                     <a:cs typeface="CMU Serif Roman" charset="0"/>
                   </a:rPr>
-                  <a:t>1500</a:t>
+                  <a:t>1..50</a:t>
                 </a:r>
               </a:p>
             </p:txBody>
@@ -6440,7 +6524,7 @@
                     <a:ea typeface="CMU Serif Roman" charset="0"/>
                     <a:cs typeface="CMU Serif Roman" charset="0"/>
                   </a:rPr>
-                  <a:t>2250</a:t>
+                  <a:t>2.25</a:t>
                 </a:r>
               </a:p>
             </p:txBody>
@@ -6480,7 +6564,7 @@
                     <a:ea typeface="CMU Serif Roman" charset="0"/>
                     <a:cs typeface="CMU Serif Roman" charset="0"/>
                   </a:rPr>
-                  <a:t>3000</a:t>
+                  <a:t>3.00</a:t>
                 </a:r>
               </a:p>
             </p:txBody>
@@ -6520,7 +6604,7 @@
                     <a:ea typeface="CMU Serif Roman" charset="0"/>
                     <a:cs typeface="CMU Serif Roman" charset="0"/>
                   </a:rPr>
-                  <a:t>3750</a:t>
+                  <a:t>3.75</a:t>
                 </a:r>
               </a:p>
             </p:txBody>
@@ -6560,7 +6644,7 @@
                     <a:ea typeface="CMU Serif Roman" charset="0"/>
                     <a:cs typeface="CMU Serif Roman" charset="0"/>
                   </a:rPr>
-                  <a:t>4500</a:t>
+                  <a:t>4.50</a:t>
                 </a:r>
               </a:p>
             </p:txBody>
@@ -6602,7 +6686,23 @@
                 <a:ea typeface="CMU Serif Roman" charset="0"/>
                 <a:cs typeface="CMU Serif Roman" charset="0"/>
               </a:rPr>
-              <a:t>Row number</a:t>
+              <a:t>Age (</a:t>
+            </a:r>
+            <a:r>
+              <a:rPr lang="en-GB" sz="1600" b="1" dirty="0" err="1">
+                <a:latin typeface="CMU Serif Roman" charset="0"/>
+                <a:ea typeface="CMU Serif Roman" charset="0"/>
+                <a:cs typeface="CMU Serif Roman" charset="0"/>
+              </a:rPr>
+              <a:t>Myr</a:t>
+            </a:r>
+            <a:r>
+              <a:rPr lang="en-GB" sz="1600" b="1" dirty="0">
+                <a:latin typeface="CMU Serif Roman" charset="0"/>
+                <a:ea typeface="CMU Serif Roman" charset="0"/>
+                <a:cs typeface="CMU Serif Roman" charset="0"/>
+              </a:rPr>
+              <a:t> BP)</a:t>
             </a:r>
           </a:p>
         </p:txBody>
@@ -6642,7 +6742,23 @@
                 <a:ea typeface="CMU Serif Roman" charset="0"/>
                 <a:cs typeface="CMU Serif Roman" charset="0"/>
               </a:rPr>
-              <a:t>Row number</a:t>
+              <a:t>Age (</a:t>
+            </a:r>
+            <a:r>
+              <a:rPr lang="en-GB" sz="1600" b="1" dirty="0" err="1">
+                <a:latin typeface="CMU Serif Roman" charset="0"/>
+                <a:ea typeface="CMU Serif Roman" charset="0"/>
+                <a:cs typeface="CMU Serif Roman" charset="0"/>
+              </a:rPr>
+              <a:t>Myr</a:t>
+            </a:r>
+            <a:r>
+              <a:rPr lang="en-GB" sz="1600" b="1" dirty="0">
+                <a:latin typeface="CMU Serif Roman" charset="0"/>
+                <a:ea typeface="CMU Serif Roman" charset="0"/>
+                <a:cs typeface="CMU Serif Roman" charset="0"/>
+              </a:rPr>
+              <a:t> BP)</a:t>
             </a:r>
           </a:p>
         </p:txBody>
@@ -6682,7 +6798,23 @@
                 <a:ea typeface="CMU Serif Roman" charset="0"/>
                 <a:cs typeface="CMU Serif Roman" charset="0"/>
               </a:rPr>
-              <a:t>Row number</a:t>
+              <a:t>Age (</a:t>
+            </a:r>
+            <a:r>
+              <a:rPr lang="en-GB" sz="1600" b="1" dirty="0" err="1">
+                <a:latin typeface="CMU Serif Roman" charset="0"/>
+                <a:ea typeface="CMU Serif Roman" charset="0"/>
+                <a:cs typeface="CMU Serif Roman" charset="0"/>
+              </a:rPr>
+              <a:t>Myr</a:t>
+            </a:r>
+            <a:r>
+              <a:rPr lang="en-GB" sz="1600" b="1" dirty="0">
+                <a:latin typeface="CMU Serif Roman" charset="0"/>
+                <a:ea typeface="CMU Serif Roman" charset="0"/>
+                <a:cs typeface="CMU Serif Roman" charset="0"/>
+              </a:rPr>
+              <a:t> BP)</a:t>
             </a:r>
           </a:p>
         </p:txBody>
@@ -6999,6 +7131,672 @@
           </a:fontRef>
         </p:style>
       </p:cxnSp>
+      <p:sp>
+        <p:nvSpPr>
+          <p:cNvPr id="107" name="TextBox 106">
+            <a:extLst>
+              <a:ext uri="{FF2B5EF4-FFF2-40B4-BE49-F238E27FC236}">
+                <a16:creationId xmlns:a16="http://schemas.microsoft.com/office/drawing/2014/main" id="{1D110546-ED3C-DC42-B2BA-4B76E09779CC}"/>
+              </a:ext>
+            </a:extLst>
+          </p:cNvPr>
+          <p:cNvSpPr txBox="1"/>
+          <p:nvPr/>
+        </p:nvSpPr>
+        <p:spPr>
+          <a:xfrm>
+            <a:off x="4011285" y="3262064"/>
+            <a:ext cx="779566" cy="307777"/>
+          </a:xfrm>
+          <a:prstGeom prst="rect">
+            <a:avLst/>
+          </a:prstGeom>
+          <a:solidFill>
+            <a:schemeClr val="bg1">
+              <a:alpha val="70000"/>
+            </a:schemeClr>
+          </a:solidFill>
+          <a:ln>
+            <a:noFill/>
+          </a:ln>
+          <a:effectLst>
+            <a:glow>
+              <a:schemeClr val="accent1">
+                <a:alpha val="40000"/>
+              </a:schemeClr>
+            </a:glow>
+            <a:softEdge rad="0"/>
+          </a:effectLst>
+        </p:spPr>
+        <p:txBody>
+          <a:bodyPr wrap="square" rtlCol="0">
+            <a:spAutoFit/>
+          </a:bodyPr>
+          <a:lstStyle/>
+          <a:p>
+            <a:pPr algn="ctr"/>
+            <a:r>
+              <a:rPr lang="en-GB" sz="1400" b="1" dirty="0">
+                <a:solidFill>
+                  <a:schemeClr val="bg1"/>
+                </a:solidFill>
+                <a:latin typeface="CMU Serif Roman" charset="0"/>
+                <a:ea typeface="CMU Serif Roman" charset="0"/>
+                <a:cs typeface="CMU Serif Roman" charset="0"/>
+              </a:rPr>
+              <a:t>89.1 ka</a:t>
+            </a:r>
+            <a:endParaRPr lang="en-GB" b="1" dirty="0">
+              <a:solidFill>
+                <a:schemeClr val="bg1"/>
+              </a:solidFill>
+              <a:latin typeface="CMU Serif Roman" charset="0"/>
+              <a:ea typeface="CMU Serif Roman" charset="0"/>
+              <a:cs typeface="CMU Serif Roman" charset="0"/>
+            </a:endParaRPr>
+          </a:p>
+        </p:txBody>
+      </p:sp>
+      <p:sp>
+        <p:nvSpPr>
+          <p:cNvPr id="112" name="TextBox 111">
+            <a:extLst>
+              <a:ext uri="{FF2B5EF4-FFF2-40B4-BE49-F238E27FC236}">
+                <a16:creationId xmlns:a16="http://schemas.microsoft.com/office/drawing/2014/main" id="{0485F29A-F3D2-7E4C-B599-C44B000CF62B}"/>
+              </a:ext>
+            </a:extLst>
+          </p:cNvPr>
+          <p:cNvSpPr txBox="1"/>
+          <p:nvPr/>
+        </p:nvSpPr>
+        <p:spPr>
+          <a:xfrm>
+            <a:off x="2485750" y="3793276"/>
+            <a:ext cx="929352" cy="307777"/>
+          </a:xfrm>
+          <a:prstGeom prst="rect">
+            <a:avLst/>
+          </a:prstGeom>
+          <a:solidFill>
+            <a:schemeClr val="bg1">
+              <a:alpha val="70000"/>
+            </a:schemeClr>
+          </a:solidFill>
+          <a:ln>
+            <a:noFill/>
+          </a:ln>
+          <a:effectLst>
+            <a:glow>
+              <a:schemeClr val="accent1">
+                <a:alpha val="40000"/>
+              </a:schemeClr>
+            </a:glow>
+            <a:softEdge rad="0"/>
+          </a:effectLst>
+        </p:spPr>
+        <p:txBody>
+          <a:bodyPr wrap="square" rtlCol="0">
+            <a:spAutoFit/>
+          </a:bodyPr>
+          <a:lstStyle/>
+          <a:p>
+            <a:pPr algn="ctr"/>
+            <a:r>
+              <a:rPr lang="en-GB" sz="1400" b="1" dirty="0">
+                <a:solidFill>
+                  <a:schemeClr val="bg1"/>
+                </a:solidFill>
+                <a:latin typeface="CMU Serif Roman" charset="0"/>
+                <a:ea typeface="CMU Serif Roman" charset="0"/>
+                <a:cs typeface="CMU Serif Roman" charset="0"/>
+              </a:rPr>
+              <a:t>100.4 ka</a:t>
+            </a:r>
+            <a:endParaRPr lang="en-GB" b="1" dirty="0">
+              <a:solidFill>
+                <a:schemeClr val="bg1"/>
+              </a:solidFill>
+              <a:latin typeface="CMU Serif Roman" charset="0"/>
+              <a:ea typeface="CMU Serif Roman" charset="0"/>
+              <a:cs typeface="CMU Serif Roman" charset="0"/>
+            </a:endParaRPr>
+          </a:p>
+        </p:txBody>
+      </p:sp>
+      <p:sp>
+        <p:nvSpPr>
+          <p:cNvPr id="113" name="TextBox 112">
+            <a:extLst>
+              <a:ext uri="{FF2B5EF4-FFF2-40B4-BE49-F238E27FC236}">
+                <a16:creationId xmlns:a16="http://schemas.microsoft.com/office/drawing/2014/main" id="{5776AA2A-7183-8544-B306-DACED62395A3}"/>
+              </a:ext>
+            </a:extLst>
+          </p:cNvPr>
+          <p:cNvSpPr txBox="1"/>
+          <p:nvPr/>
+        </p:nvSpPr>
+        <p:spPr>
+          <a:xfrm>
+            <a:off x="1130115" y="4552205"/>
+            <a:ext cx="929352" cy="307777"/>
+          </a:xfrm>
+          <a:prstGeom prst="rect">
+            <a:avLst/>
+          </a:prstGeom>
+          <a:solidFill>
+            <a:schemeClr val="bg1">
+              <a:alpha val="70000"/>
+            </a:schemeClr>
+          </a:solidFill>
+          <a:ln>
+            <a:noFill/>
+          </a:ln>
+          <a:effectLst>
+            <a:glow>
+              <a:schemeClr val="accent1">
+                <a:alpha val="40000"/>
+              </a:schemeClr>
+            </a:glow>
+            <a:softEdge rad="0"/>
+          </a:effectLst>
+        </p:spPr>
+        <p:txBody>
+          <a:bodyPr wrap="square" rtlCol="0">
+            <a:spAutoFit/>
+          </a:bodyPr>
+          <a:lstStyle/>
+          <a:p>
+            <a:pPr algn="ctr"/>
+            <a:r>
+              <a:rPr lang="en-GB" sz="1400" b="1" dirty="0">
+                <a:solidFill>
+                  <a:schemeClr val="bg1"/>
+                </a:solidFill>
+                <a:latin typeface="CMU Serif Roman" charset="0"/>
+                <a:ea typeface="CMU Serif Roman" charset="0"/>
+                <a:cs typeface="CMU Serif Roman" charset="0"/>
+              </a:rPr>
+              <a:t>401.7 ka</a:t>
+            </a:r>
+            <a:endParaRPr lang="en-GB" b="1" dirty="0">
+              <a:solidFill>
+                <a:schemeClr val="bg1"/>
+              </a:solidFill>
+              <a:latin typeface="CMU Serif Roman" charset="0"/>
+              <a:ea typeface="CMU Serif Roman" charset="0"/>
+              <a:cs typeface="CMU Serif Roman" charset="0"/>
+            </a:endParaRPr>
+          </a:p>
+        </p:txBody>
+      </p:sp>
+      <p:grpSp>
+        <p:nvGrpSpPr>
+          <p:cNvPr id="12" name="Group 11">
+            <a:extLst>
+              <a:ext uri="{FF2B5EF4-FFF2-40B4-BE49-F238E27FC236}">
+                <a16:creationId xmlns:a16="http://schemas.microsoft.com/office/drawing/2014/main" id="{E1DC880E-754E-8C45-A217-545289340B5C}"/>
+              </a:ext>
+            </a:extLst>
+          </p:cNvPr>
+          <p:cNvGrpSpPr/>
+          <p:nvPr/>
+        </p:nvGrpSpPr>
+        <p:grpSpPr>
+          <a:xfrm>
+            <a:off x="3730507" y="3398109"/>
+            <a:ext cx="235068" cy="144941"/>
+            <a:chOff x="3730507" y="3398109"/>
+            <a:chExt cx="235068" cy="144941"/>
+          </a:xfrm>
+        </p:grpSpPr>
+        <p:cxnSp>
+          <p:nvCxnSpPr>
+            <p:cNvPr id="115" name="Straight Arrow Connector 114">
+              <a:extLst>
+                <a:ext uri="{FF2B5EF4-FFF2-40B4-BE49-F238E27FC236}">
+                  <a16:creationId xmlns:a16="http://schemas.microsoft.com/office/drawing/2014/main" id="{683983C3-A224-7543-807C-9FF8AEF6355E}"/>
+                </a:ext>
+              </a:extLst>
+            </p:cNvPr>
+            <p:cNvCxnSpPr>
+              <a:cxnSpLocks/>
+            </p:cNvCxnSpPr>
+            <p:nvPr/>
+          </p:nvCxnSpPr>
+          <p:spPr>
+            <a:xfrm>
+              <a:off x="3730507" y="3398109"/>
+              <a:ext cx="0" cy="144941"/>
+            </a:xfrm>
+            <a:prstGeom prst="straightConnector1">
+              <a:avLst/>
+            </a:prstGeom>
+            <a:ln w="25400">
+              <a:solidFill>
+                <a:schemeClr val="tx1">
+                  <a:alpha val="50000"/>
+                </a:schemeClr>
+              </a:solidFill>
+              <a:tailEnd type="triangle"/>
+            </a:ln>
+          </p:spPr>
+          <p:style>
+            <a:lnRef idx="1">
+              <a:schemeClr val="accent1"/>
+            </a:lnRef>
+            <a:fillRef idx="0">
+              <a:schemeClr val="accent1"/>
+            </a:fillRef>
+            <a:effectRef idx="0">
+              <a:schemeClr val="accent1"/>
+            </a:effectRef>
+            <a:fontRef idx="minor">
+              <a:schemeClr val="tx1"/>
+            </a:fontRef>
+          </p:style>
+        </p:cxnSp>
+        <p:cxnSp>
+          <p:nvCxnSpPr>
+            <p:cNvPr id="8" name="Straight Connector 7">
+              <a:extLst>
+                <a:ext uri="{FF2B5EF4-FFF2-40B4-BE49-F238E27FC236}">
+                  <a16:creationId xmlns:a16="http://schemas.microsoft.com/office/drawing/2014/main" id="{7F1C13D9-2F1F-144A-81C6-5C4A2DA331C4}"/>
+                </a:ext>
+              </a:extLst>
+            </p:cNvPr>
+            <p:cNvCxnSpPr>
+              <a:cxnSpLocks/>
+            </p:cNvCxnSpPr>
+            <p:nvPr/>
+          </p:nvCxnSpPr>
+          <p:spPr>
+            <a:xfrm flipH="1">
+              <a:off x="3743149" y="3410809"/>
+              <a:ext cx="222426" cy="0"/>
+            </a:xfrm>
+            <a:prstGeom prst="line">
+              <a:avLst/>
+            </a:prstGeom>
+            <a:ln w="25400">
+              <a:solidFill>
+                <a:schemeClr val="tx1">
+                  <a:alpha val="50000"/>
+                </a:schemeClr>
+              </a:solidFill>
+            </a:ln>
+          </p:spPr>
+          <p:style>
+            <a:lnRef idx="1">
+              <a:schemeClr val="accent1"/>
+            </a:lnRef>
+            <a:fillRef idx="0">
+              <a:schemeClr val="accent1"/>
+            </a:fillRef>
+            <a:effectRef idx="0">
+              <a:schemeClr val="accent1"/>
+            </a:effectRef>
+            <a:fontRef idx="minor">
+              <a:schemeClr val="tx1"/>
+            </a:fontRef>
+          </p:style>
+        </p:cxnSp>
+      </p:grpSp>
+      <p:grpSp>
+        <p:nvGrpSpPr>
+          <p:cNvPr id="119" name="Group 118">
+            <a:extLst>
+              <a:ext uri="{FF2B5EF4-FFF2-40B4-BE49-F238E27FC236}">
+                <a16:creationId xmlns:a16="http://schemas.microsoft.com/office/drawing/2014/main" id="{9345AE43-7A93-D244-BF7D-02D8C62DE5B6}"/>
+              </a:ext>
+            </a:extLst>
+          </p:cNvPr>
+          <p:cNvGrpSpPr/>
+          <p:nvPr/>
+        </p:nvGrpSpPr>
+        <p:grpSpPr>
+          <a:xfrm>
+            <a:off x="2217686" y="3935425"/>
+            <a:ext cx="235068" cy="144941"/>
+            <a:chOff x="3730507" y="3398109"/>
+            <a:chExt cx="235068" cy="144941"/>
+          </a:xfrm>
+        </p:grpSpPr>
+        <p:cxnSp>
+          <p:nvCxnSpPr>
+            <p:cNvPr id="120" name="Straight Arrow Connector 119">
+              <a:extLst>
+                <a:ext uri="{FF2B5EF4-FFF2-40B4-BE49-F238E27FC236}">
+                  <a16:creationId xmlns:a16="http://schemas.microsoft.com/office/drawing/2014/main" id="{464B6A9D-F7B4-2043-AD47-2397CDB1EC2A}"/>
+                </a:ext>
+              </a:extLst>
+            </p:cNvPr>
+            <p:cNvCxnSpPr>
+              <a:cxnSpLocks/>
+            </p:cNvCxnSpPr>
+            <p:nvPr/>
+          </p:nvCxnSpPr>
+          <p:spPr>
+            <a:xfrm>
+              <a:off x="3730507" y="3398109"/>
+              <a:ext cx="0" cy="144941"/>
+            </a:xfrm>
+            <a:prstGeom prst="straightConnector1">
+              <a:avLst/>
+            </a:prstGeom>
+            <a:ln w="25400">
+              <a:solidFill>
+                <a:schemeClr val="tx1">
+                  <a:alpha val="50000"/>
+                </a:schemeClr>
+              </a:solidFill>
+              <a:tailEnd type="triangle"/>
+            </a:ln>
+          </p:spPr>
+          <p:style>
+            <a:lnRef idx="1">
+              <a:schemeClr val="accent1"/>
+            </a:lnRef>
+            <a:fillRef idx="0">
+              <a:schemeClr val="accent1"/>
+            </a:fillRef>
+            <a:effectRef idx="0">
+              <a:schemeClr val="accent1"/>
+            </a:effectRef>
+            <a:fontRef idx="minor">
+              <a:schemeClr val="tx1"/>
+            </a:fontRef>
+          </p:style>
+        </p:cxnSp>
+        <p:cxnSp>
+          <p:nvCxnSpPr>
+            <p:cNvPr id="121" name="Straight Connector 120">
+              <a:extLst>
+                <a:ext uri="{FF2B5EF4-FFF2-40B4-BE49-F238E27FC236}">
+                  <a16:creationId xmlns:a16="http://schemas.microsoft.com/office/drawing/2014/main" id="{2D6E9F3C-36B0-B849-A738-471C8975F4A2}"/>
+                </a:ext>
+              </a:extLst>
+            </p:cNvPr>
+            <p:cNvCxnSpPr>
+              <a:cxnSpLocks/>
+            </p:cNvCxnSpPr>
+            <p:nvPr/>
+          </p:nvCxnSpPr>
+          <p:spPr>
+            <a:xfrm flipH="1">
+              <a:off x="3743149" y="3410809"/>
+              <a:ext cx="222426" cy="0"/>
+            </a:xfrm>
+            <a:prstGeom prst="line">
+              <a:avLst/>
+            </a:prstGeom>
+            <a:ln w="25400">
+              <a:solidFill>
+                <a:schemeClr val="tx1">
+                  <a:alpha val="50000"/>
+                </a:schemeClr>
+              </a:solidFill>
+            </a:ln>
+          </p:spPr>
+          <p:style>
+            <a:lnRef idx="1">
+              <a:schemeClr val="accent1"/>
+            </a:lnRef>
+            <a:fillRef idx="0">
+              <a:schemeClr val="accent1"/>
+            </a:fillRef>
+            <a:effectRef idx="0">
+              <a:schemeClr val="accent1"/>
+            </a:effectRef>
+            <a:fontRef idx="minor">
+              <a:schemeClr val="tx1"/>
+            </a:fontRef>
+          </p:style>
+        </p:cxnSp>
+      </p:grpSp>
+      <p:grpSp>
+        <p:nvGrpSpPr>
+          <p:cNvPr id="122" name="Group 121">
+            <a:extLst>
+              <a:ext uri="{FF2B5EF4-FFF2-40B4-BE49-F238E27FC236}">
+                <a16:creationId xmlns:a16="http://schemas.microsoft.com/office/drawing/2014/main" id="{E17B6952-42F1-AE4F-AF55-6116FE6161E6}"/>
+              </a:ext>
+            </a:extLst>
+          </p:cNvPr>
+          <p:cNvGrpSpPr/>
+          <p:nvPr/>
+        </p:nvGrpSpPr>
+        <p:grpSpPr>
+          <a:xfrm rot="10800000">
+            <a:off x="2072427" y="4532787"/>
+            <a:ext cx="235068" cy="210135"/>
+            <a:chOff x="3730507" y="3398108"/>
+            <a:chExt cx="235068" cy="210135"/>
+          </a:xfrm>
+        </p:grpSpPr>
+        <p:cxnSp>
+          <p:nvCxnSpPr>
+            <p:cNvPr id="123" name="Straight Arrow Connector 122">
+              <a:extLst>
+                <a:ext uri="{FF2B5EF4-FFF2-40B4-BE49-F238E27FC236}">
+                  <a16:creationId xmlns:a16="http://schemas.microsoft.com/office/drawing/2014/main" id="{C32A9982-8A73-0641-905B-3494CBF5F2F9}"/>
+                </a:ext>
+              </a:extLst>
+            </p:cNvPr>
+            <p:cNvCxnSpPr>
+              <a:cxnSpLocks/>
+            </p:cNvCxnSpPr>
+            <p:nvPr/>
+          </p:nvCxnSpPr>
+          <p:spPr>
+            <a:xfrm rot="10800000" flipV="1">
+              <a:off x="3730507" y="3398108"/>
+              <a:ext cx="0" cy="210135"/>
+            </a:xfrm>
+            <a:prstGeom prst="straightConnector1">
+              <a:avLst/>
+            </a:prstGeom>
+            <a:ln w="25400">
+              <a:solidFill>
+                <a:schemeClr val="tx1">
+                  <a:alpha val="50000"/>
+                </a:schemeClr>
+              </a:solidFill>
+              <a:tailEnd type="triangle"/>
+            </a:ln>
+          </p:spPr>
+          <p:style>
+            <a:lnRef idx="1">
+              <a:schemeClr val="accent1"/>
+            </a:lnRef>
+            <a:fillRef idx="0">
+              <a:schemeClr val="accent1"/>
+            </a:fillRef>
+            <a:effectRef idx="0">
+              <a:schemeClr val="accent1"/>
+            </a:effectRef>
+            <a:fontRef idx="minor">
+              <a:schemeClr val="tx1"/>
+            </a:fontRef>
+          </p:style>
+        </p:cxnSp>
+        <p:cxnSp>
+          <p:nvCxnSpPr>
+            <p:cNvPr id="124" name="Straight Connector 123">
+              <a:extLst>
+                <a:ext uri="{FF2B5EF4-FFF2-40B4-BE49-F238E27FC236}">
+                  <a16:creationId xmlns:a16="http://schemas.microsoft.com/office/drawing/2014/main" id="{C46F66E2-6EFA-AC4B-9B4C-396EC0FBD7FF}"/>
+                </a:ext>
+              </a:extLst>
+            </p:cNvPr>
+            <p:cNvCxnSpPr>
+              <a:cxnSpLocks/>
+            </p:cNvCxnSpPr>
+            <p:nvPr/>
+          </p:nvCxnSpPr>
+          <p:spPr>
+            <a:xfrm flipH="1">
+              <a:off x="3743149" y="3410809"/>
+              <a:ext cx="222426" cy="0"/>
+            </a:xfrm>
+            <a:prstGeom prst="line">
+              <a:avLst/>
+            </a:prstGeom>
+            <a:ln w="25400">
+              <a:solidFill>
+                <a:schemeClr val="tx1">
+                  <a:alpha val="50000"/>
+                </a:schemeClr>
+              </a:solidFill>
+            </a:ln>
+          </p:spPr>
+          <p:style>
+            <a:lnRef idx="1">
+              <a:schemeClr val="accent1"/>
+            </a:lnRef>
+            <a:fillRef idx="0">
+              <a:schemeClr val="accent1"/>
+            </a:fillRef>
+            <a:effectRef idx="0">
+              <a:schemeClr val="accent1"/>
+            </a:effectRef>
+            <a:fontRef idx="minor">
+              <a:schemeClr val="tx1"/>
+            </a:fontRef>
+          </p:style>
+        </p:cxnSp>
+      </p:grpSp>
+      <p:sp>
+        <p:nvSpPr>
+          <p:cNvPr id="125" name="TextBox 124">
+            <a:extLst>
+              <a:ext uri="{FF2B5EF4-FFF2-40B4-BE49-F238E27FC236}">
+                <a16:creationId xmlns:a16="http://schemas.microsoft.com/office/drawing/2014/main" id="{B2CD1834-C88E-BC48-A765-19208613643A}"/>
+              </a:ext>
+            </a:extLst>
+          </p:cNvPr>
+          <p:cNvSpPr txBox="1"/>
+          <p:nvPr/>
+        </p:nvSpPr>
+        <p:spPr>
+          <a:xfrm>
+            <a:off x="6325037" y="3271485"/>
+            <a:ext cx="779566" cy="307777"/>
+          </a:xfrm>
+          <a:prstGeom prst="rect">
+            <a:avLst/>
+          </a:prstGeom>
+          <a:solidFill>
+            <a:schemeClr val="bg1">
+              <a:alpha val="70000"/>
+            </a:schemeClr>
+          </a:solidFill>
+          <a:ln>
+            <a:noFill/>
+          </a:ln>
+          <a:effectLst>
+            <a:glow>
+              <a:schemeClr val="accent1">
+                <a:alpha val="40000"/>
+              </a:schemeClr>
+            </a:glow>
+            <a:softEdge rad="0"/>
+          </a:effectLst>
+        </p:spPr>
+        <p:txBody>
+          <a:bodyPr wrap="square" rtlCol="0">
+            <a:spAutoFit/>
+          </a:bodyPr>
+          <a:lstStyle/>
+          <a:p>
+            <a:pPr algn="ctr"/>
+            <a:r>
+              <a:rPr lang="en-GB" sz="1400" b="1" dirty="0">
+                <a:solidFill>
+                  <a:schemeClr val="bg1"/>
+                </a:solidFill>
+                <a:latin typeface="CMU Serif Roman" charset="0"/>
+                <a:ea typeface="CMU Serif Roman" charset="0"/>
+                <a:cs typeface="CMU Serif Roman" charset="0"/>
+              </a:rPr>
+              <a:t>39.4 ka</a:t>
+            </a:r>
+            <a:endParaRPr lang="en-GB" b="1" dirty="0">
+              <a:solidFill>
+                <a:schemeClr val="bg1"/>
+              </a:solidFill>
+              <a:latin typeface="CMU Serif Roman" charset="0"/>
+              <a:ea typeface="CMU Serif Roman" charset="0"/>
+              <a:cs typeface="CMU Serif Roman" charset="0"/>
+            </a:endParaRPr>
+          </a:p>
+        </p:txBody>
+      </p:sp>
+      <p:sp>
+        <p:nvSpPr>
+          <p:cNvPr id="126" name="TextBox 125">
+            <a:extLst>
+              <a:ext uri="{FF2B5EF4-FFF2-40B4-BE49-F238E27FC236}">
+                <a16:creationId xmlns:a16="http://schemas.microsoft.com/office/drawing/2014/main" id="{64C6431D-F291-D941-BFB9-816E6F5E1576}"/>
+              </a:ext>
+            </a:extLst>
+          </p:cNvPr>
+          <p:cNvSpPr txBox="1"/>
+          <p:nvPr/>
+        </p:nvSpPr>
+        <p:spPr>
+          <a:xfrm>
+            <a:off x="10089744" y="2499842"/>
+            <a:ext cx="779566" cy="307777"/>
+          </a:xfrm>
+          <a:prstGeom prst="rect">
+            <a:avLst/>
+          </a:prstGeom>
+          <a:solidFill>
+            <a:schemeClr val="bg1">
+              <a:alpha val="70000"/>
+            </a:schemeClr>
+          </a:solidFill>
+          <a:ln>
+            <a:noFill/>
+          </a:ln>
+          <a:effectLst>
+            <a:glow>
+              <a:schemeClr val="accent1">
+                <a:alpha val="40000"/>
+              </a:schemeClr>
+            </a:glow>
+            <a:softEdge rad="0"/>
+          </a:effectLst>
+        </p:spPr>
+        <p:txBody>
+          <a:bodyPr wrap="square" rtlCol="0">
+            <a:spAutoFit/>
+          </a:bodyPr>
+          <a:lstStyle/>
+          <a:p>
+            <a:pPr algn="ctr"/>
+            <a:r>
+              <a:rPr lang="en-GB" sz="1400" b="1" dirty="0">
+                <a:solidFill>
+                  <a:schemeClr val="bg1"/>
+                </a:solidFill>
+                <a:latin typeface="CMU Serif Roman" charset="0"/>
+                <a:ea typeface="CMU Serif Roman" charset="0"/>
+                <a:cs typeface="CMU Serif Roman" charset="0"/>
+              </a:rPr>
+              <a:t>21.1 ka</a:t>
+            </a:r>
+            <a:endParaRPr lang="en-GB" b="1" dirty="0">
+              <a:solidFill>
+                <a:schemeClr val="bg1"/>
+              </a:solidFill>
+              <a:latin typeface="CMU Serif Roman" charset="0"/>
+              <a:ea typeface="CMU Serif Roman" charset="0"/>
+              <a:cs typeface="CMU Serif Roman" charset="0"/>
+            </a:endParaRPr>
+          </a:p>
+        </p:txBody>
+      </p:sp>
     </p:spTree>
     <p:extLst>
       <p:ext uri="{BB962C8B-B14F-4D97-AF65-F5344CB8AC3E}">
@@ -7074,7 +7872,7 @@
         </p:nvCxnSpPr>
         <p:spPr>
           <a:xfrm flipH="1">
-            <a:off x="7480745" y="4313637"/>
+            <a:off x="7480745" y="4338689"/>
             <a:ext cx="766487" cy="0"/>
           </a:xfrm>
           <a:prstGeom prst="line">
@@ -7417,7 +8215,7 @@
         </p:nvSpPr>
         <p:spPr>
           <a:xfrm>
-            <a:off x="3594949" y="4995446"/>
+            <a:off x="3586610" y="5022128"/>
             <a:ext cx="710527" cy="338554"/>
           </a:xfrm>
           <a:prstGeom prst="rect">
@@ -7438,7 +8236,7 @@
                 <a:ea typeface="CMU Serif Roman" charset="0"/>
                 <a:cs typeface="CMU Serif Roman" charset="0"/>
               </a:rPr>
-              <a:t>0</a:t>
+              <a:t>0.00</a:t>
             </a:r>
           </a:p>
         </p:txBody>
@@ -7478,7 +8276,7 @@
                 <a:ea typeface="CMU Serif Roman" charset="0"/>
                 <a:cs typeface="CMU Serif Roman" charset="0"/>
               </a:rPr>
-              <a:t>250</a:t>
+              <a:t>0.75</a:t>
             </a:r>
           </a:p>
         </p:txBody>
@@ -7518,7 +8316,7 @@
                 <a:ea typeface="CMU Serif Roman" charset="0"/>
                 <a:cs typeface="CMU Serif Roman" charset="0"/>
               </a:rPr>
-              <a:t>500</a:t>
+              <a:t>1.50</a:t>
             </a:r>
           </a:p>
         </p:txBody>
@@ -7558,7 +8356,7 @@
                 <a:ea typeface="CMU Serif Roman" charset="0"/>
                 <a:cs typeface="CMU Serif Roman" charset="0"/>
               </a:rPr>
-              <a:t>750</a:t>
+              <a:t>2.25</a:t>
             </a:r>
           </a:p>
         </p:txBody>
@@ -7577,7 +8375,7 @@
         </p:nvSpPr>
         <p:spPr>
           <a:xfrm>
-            <a:off x="5717040" y="5008989"/>
+            <a:off x="5717282" y="5017776"/>
             <a:ext cx="710527" cy="338554"/>
           </a:xfrm>
           <a:prstGeom prst="rect">
@@ -7598,7 +8396,7 @@
                 <a:ea typeface="CMU Serif Roman" charset="0"/>
                 <a:cs typeface="CMU Serif Roman" charset="0"/>
               </a:rPr>
-              <a:t>1000</a:t>
+              <a:t>3.00</a:t>
             </a:r>
           </a:p>
         </p:txBody>
@@ -7638,7 +8436,7 @@
                 <a:ea typeface="CMU Serif Roman" charset="0"/>
                 <a:cs typeface="CMU Serif Roman" charset="0"/>
               </a:rPr>
-              <a:t>1250</a:t>
+              <a:t>3.75</a:t>
             </a:r>
           </a:p>
         </p:txBody>
@@ -7678,7 +8476,7 @@
                 <a:ea typeface="CMU Serif Roman" charset="0"/>
                 <a:cs typeface="CMU Serif Roman" charset="0"/>
               </a:rPr>
-              <a:t>1500</a:t>
+              <a:t>4.50</a:t>
             </a:r>
           </a:p>
         </p:txBody>
@@ -7804,7 +8602,7 @@
                 <a:ea typeface="CMU Serif Roman" charset="0"/>
                 <a:cs typeface="CMU Serif Roman" charset="0"/>
               </a:rPr>
-              <a:t>1750</a:t>
+              <a:t>5.25</a:t>
             </a:r>
           </a:p>
         </p:txBody>
@@ -7823,7 +8621,7 @@
         </p:nvSpPr>
         <p:spPr>
           <a:xfrm>
-            <a:off x="7842328" y="5011958"/>
+            <a:off x="7833437" y="5002987"/>
             <a:ext cx="710527" cy="338554"/>
           </a:xfrm>
           <a:prstGeom prst="rect">
@@ -7844,7 +8642,7 @@
                 <a:ea typeface="CMU Serif Roman" charset="0"/>
                 <a:cs typeface="CMU Serif Roman" charset="0"/>
               </a:rPr>
-              <a:t>2000</a:t>
+              <a:t>6.00</a:t>
             </a:r>
           </a:p>
         </p:txBody>
@@ -7863,7 +8661,7 @@
         </p:nvSpPr>
         <p:spPr>
           <a:xfrm>
-            <a:off x="5309658" y="5298387"/>
+            <a:off x="5246759" y="5311856"/>
             <a:ext cx="1690657" cy="338554"/>
           </a:xfrm>
           <a:prstGeom prst="rect">
@@ -7884,7 +8682,23 @@
                 <a:ea typeface="CMU Serif Roman" charset="0"/>
                 <a:cs typeface="CMU Serif Roman" charset="0"/>
               </a:rPr>
-              <a:t>Row number</a:t>
+              <a:t>Age (</a:t>
+            </a:r>
+            <a:r>
+              <a:rPr lang="en-GB" sz="1600" b="1" dirty="0" err="1">
+                <a:latin typeface="CMU Serif Roman" charset="0"/>
+                <a:ea typeface="CMU Serif Roman" charset="0"/>
+                <a:cs typeface="CMU Serif Roman" charset="0"/>
+              </a:rPr>
+              <a:t>Myr</a:t>
+            </a:r>
+            <a:r>
+              <a:rPr lang="en-GB" sz="1600" b="1" dirty="0">
+                <a:latin typeface="CMU Serif Roman" charset="0"/>
+                <a:ea typeface="CMU Serif Roman" charset="0"/>
+                <a:cs typeface="CMU Serif Roman" charset="0"/>
+              </a:rPr>
+              <a:t> BP)</a:t>
             </a:r>
           </a:p>
         </p:txBody>
@@ -8020,8 +8834,8 @@
         </p:nvSpPr>
         <p:spPr>
           <a:xfrm rot="16200000">
-            <a:off x="2446065" y="3107405"/>
-            <a:ext cx="1690657" cy="338554"/>
+            <a:off x="1404262" y="3138598"/>
+            <a:ext cx="2919737" cy="338554"/>
           </a:xfrm>
           <a:prstGeom prst="rect">
             <a:avLst/>
@@ -8041,7 +8855,7 @@
                 <a:ea typeface="CMU Serif Roman" charset="0"/>
                 <a:cs typeface="CMU Serif Roman" charset="0"/>
               </a:rPr>
-              <a:t>log2 scale</a:t>
+              <a:t>Periodicity Wavelength (ka)</a:t>
             </a:r>
           </a:p>
         </p:txBody>
@@ -8447,7 +9261,7 @@
         </p:nvSpPr>
         <p:spPr>
           <a:xfrm>
-            <a:off x="3293927" y="1823363"/>
+            <a:off x="3278975" y="1823198"/>
             <a:ext cx="710527" cy="338554"/>
           </a:xfrm>
           <a:prstGeom prst="rect">
@@ -8468,7 +9282,7 @@
                 <a:ea typeface="CMU Serif Roman" charset="0"/>
                 <a:cs typeface="CMU Serif Roman" charset="0"/>
               </a:rPr>
-              <a:t>1</a:t>
+              <a:t>6.0</a:t>
             </a:r>
           </a:p>
         </p:txBody>
@@ -8487,7 +9301,7 @@
         </p:nvSpPr>
         <p:spPr>
           <a:xfrm>
-            <a:off x="3293927" y="2121248"/>
+            <a:off x="3223672" y="2109412"/>
             <a:ext cx="710527" cy="338554"/>
           </a:xfrm>
           <a:prstGeom prst="rect">
@@ -8508,7 +9322,7 @@
                 <a:ea typeface="CMU Serif Roman" charset="0"/>
                 <a:cs typeface="CMU Serif Roman" charset="0"/>
               </a:rPr>
-              <a:t>2</a:t>
+              <a:t>12.0</a:t>
             </a:r>
           </a:p>
         </p:txBody>
@@ -8527,7 +9341,7 @@
         </p:nvSpPr>
         <p:spPr>
           <a:xfrm>
-            <a:off x="3293928" y="2450858"/>
+            <a:off x="3227835" y="2438102"/>
             <a:ext cx="710527" cy="338554"/>
           </a:xfrm>
           <a:prstGeom prst="rect">
@@ -8548,7 +9362,7 @@
                 <a:ea typeface="CMU Serif Roman" charset="0"/>
                 <a:cs typeface="CMU Serif Roman" charset="0"/>
               </a:rPr>
-              <a:t>3</a:t>
+              <a:t>24.0</a:t>
             </a:r>
           </a:p>
         </p:txBody>
@@ -8567,7 +9381,7 @@
         </p:nvSpPr>
         <p:spPr>
           <a:xfrm>
-            <a:off x="3289552" y="2783400"/>
+            <a:off x="3222152" y="2763350"/>
             <a:ext cx="710527" cy="338554"/>
           </a:xfrm>
           <a:prstGeom prst="rect">
@@ -8588,7 +9402,7 @@
                 <a:ea typeface="CMU Serif Roman" charset="0"/>
                 <a:cs typeface="CMU Serif Roman" charset="0"/>
               </a:rPr>
-              <a:t>4</a:t>
+              <a:t>48.0</a:t>
             </a:r>
           </a:p>
         </p:txBody>
@@ -8607,7 +9421,7 @@
         </p:nvSpPr>
         <p:spPr>
           <a:xfrm>
-            <a:off x="3293927" y="3088166"/>
+            <a:off x="3215307" y="3095442"/>
             <a:ext cx="710527" cy="338554"/>
           </a:xfrm>
           <a:prstGeom prst="rect">
@@ -8628,7 +9442,7 @@
                 <a:ea typeface="CMU Serif Roman" charset="0"/>
                 <a:cs typeface="CMU Serif Roman" charset="0"/>
               </a:rPr>
-              <a:t>5</a:t>
+              <a:t>96.0</a:t>
             </a:r>
           </a:p>
         </p:txBody>
@@ -8647,7 +9461,7 @@
         </p:nvSpPr>
         <p:spPr>
           <a:xfrm>
-            <a:off x="3301166" y="3438375"/>
+            <a:off x="3169532" y="3422621"/>
             <a:ext cx="710527" cy="338554"/>
           </a:xfrm>
           <a:prstGeom prst="rect">
@@ -8668,7 +9482,7 @@
                 <a:ea typeface="CMU Serif Roman" charset="0"/>
                 <a:cs typeface="CMU Serif Roman" charset="0"/>
               </a:rPr>
-              <a:t>6</a:t>
+              <a:t>192.0</a:t>
             </a:r>
           </a:p>
         </p:txBody>
@@ -8687,7 +9501,7 @@
         </p:nvSpPr>
         <p:spPr>
           <a:xfrm>
-            <a:off x="3301166" y="3764904"/>
+            <a:off x="3178967" y="3754710"/>
             <a:ext cx="710527" cy="338554"/>
           </a:xfrm>
           <a:prstGeom prst="rect">
@@ -8708,7 +9522,7 @@
                 <a:ea typeface="CMU Serif Roman" charset="0"/>
                 <a:cs typeface="CMU Serif Roman" charset="0"/>
               </a:rPr>
-              <a:t>7</a:t>
+              <a:t>384.0</a:t>
             </a:r>
           </a:p>
         </p:txBody>
@@ -8727,7 +9541,7 @@
         </p:nvSpPr>
         <p:spPr>
           <a:xfrm>
-            <a:off x="3301166" y="4105413"/>
+            <a:off x="3169532" y="4087626"/>
             <a:ext cx="710527" cy="338554"/>
           </a:xfrm>
           <a:prstGeom prst="rect">
@@ -8748,7 +9562,7 @@
                 <a:ea typeface="CMU Serif Roman" charset="0"/>
                 <a:cs typeface="CMU Serif Roman" charset="0"/>
               </a:rPr>
-              <a:t>8</a:t>
+              <a:t>768.0</a:t>
             </a:r>
           </a:p>
         </p:txBody>
@@ -8767,8 +9581,8 @@
         </p:nvSpPr>
         <p:spPr>
           <a:xfrm>
-            <a:off x="3301166" y="4427281"/>
-            <a:ext cx="710527" cy="338554"/>
+            <a:off x="3033408" y="4409627"/>
+            <a:ext cx="873088" cy="338554"/>
           </a:xfrm>
           <a:prstGeom prst="rect">
             <a:avLst/>
@@ -8788,7 +9602,7 @@
                 <a:ea typeface="CMU Serif Roman" charset="0"/>
                 <a:cs typeface="CMU Serif Roman" charset="0"/>
               </a:rPr>
-              <a:t>9</a:t>
+              <a:t>1536.0</a:t>
             </a:r>
           </a:p>
         </p:txBody>
@@ -9013,8 +9827,8 @@
         </p:nvCxnSpPr>
         <p:spPr>
           <a:xfrm flipH="1">
-            <a:off x="3944768" y="4493253"/>
-            <a:ext cx="4302463" cy="0"/>
+            <a:off x="3944769" y="4493253"/>
+            <a:ext cx="1232011" cy="0"/>
           </a:xfrm>
           <a:prstGeom prst="line">
             <a:avLst/>
@@ -9057,7 +9871,7 @@
         </p:nvCxnSpPr>
         <p:spPr>
           <a:xfrm flipH="1">
-            <a:off x="3944607" y="4313637"/>
+            <a:off x="3944607" y="4338689"/>
             <a:ext cx="3523613" cy="0"/>
           </a:xfrm>
           <a:prstGeom prst="line">
@@ -9087,6 +9901,474 @@
           </a:fontRef>
         </p:style>
       </p:cxnSp>
+      <p:sp>
+        <p:nvSpPr>
+          <p:cNvPr id="77" name="TextBox 76">
+            <a:extLst>
+              <a:ext uri="{FF2B5EF4-FFF2-40B4-BE49-F238E27FC236}">
+                <a16:creationId xmlns:a16="http://schemas.microsoft.com/office/drawing/2014/main" id="{EB1C17C5-DF91-8042-B15E-9656BB37B269}"/>
+              </a:ext>
+            </a:extLst>
+          </p:cNvPr>
+          <p:cNvSpPr txBox="1"/>
+          <p:nvPr/>
+        </p:nvSpPr>
+        <p:spPr>
+          <a:xfrm>
+            <a:off x="3989502" y="4132187"/>
+            <a:ext cx="1126675" cy="307777"/>
+          </a:xfrm>
+          <a:prstGeom prst="rect">
+            <a:avLst/>
+          </a:prstGeom>
+          <a:solidFill>
+            <a:schemeClr val="bg1">
+              <a:alpha val="70000"/>
+            </a:schemeClr>
+          </a:solidFill>
+          <a:ln>
+            <a:noFill/>
+          </a:ln>
+          <a:effectLst>
+            <a:glow>
+              <a:schemeClr val="accent1">
+                <a:alpha val="40000"/>
+              </a:schemeClr>
+            </a:glow>
+            <a:softEdge rad="0"/>
+          </a:effectLst>
+        </p:spPr>
+        <p:txBody>
+          <a:bodyPr wrap="square" rtlCol="0">
+            <a:spAutoFit/>
+          </a:bodyPr>
+          <a:lstStyle/>
+          <a:p>
+            <a:pPr algn="ctr"/>
+            <a:r>
+              <a:rPr lang="en-GB" sz="1400" b="1" dirty="0">
+                <a:solidFill>
+                  <a:schemeClr val="bg1"/>
+                </a:solidFill>
+                <a:latin typeface="CMU Serif Roman" charset="0"/>
+                <a:ea typeface="CMU Serif Roman" charset="0"/>
+                <a:cs typeface="CMU Serif Roman" charset="0"/>
+              </a:rPr>
+              <a:t>1274.6 ka</a:t>
+            </a:r>
+            <a:endParaRPr lang="en-GB" b="1" dirty="0">
+              <a:solidFill>
+                <a:schemeClr val="bg1"/>
+              </a:solidFill>
+              <a:latin typeface="CMU Serif Roman" charset="0"/>
+              <a:ea typeface="CMU Serif Roman" charset="0"/>
+              <a:cs typeface="CMU Serif Roman" charset="0"/>
+            </a:endParaRPr>
+          </a:p>
+        </p:txBody>
+      </p:sp>
+      <p:sp>
+        <p:nvSpPr>
+          <p:cNvPr id="78" name="TextBox 77">
+            <a:extLst>
+              <a:ext uri="{FF2B5EF4-FFF2-40B4-BE49-F238E27FC236}">
+                <a16:creationId xmlns:a16="http://schemas.microsoft.com/office/drawing/2014/main" id="{12ADB811-4E60-7F47-947A-07D06220E525}"/>
+              </a:ext>
+            </a:extLst>
+          </p:cNvPr>
+          <p:cNvSpPr txBox="1"/>
+          <p:nvPr/>
+        </p:nvSpPr>
+        <p:spPr>
+          <a:xfrm>
+            <a:off x="7365787" y="3990216"/>
+            <a:ext cx="862574" cy="307777"/>
+          </a:xfrm>
+          <a:prstGeom prst="rect">
+            <a:avLst/>
+          </a:prstGeom>
+          <a:solidFill>
+            <a:schemeClr val="bg1">
+              <a:alpha val="70000"/>
+            </a:schemeClr>
+          </a:solidFill>
+          <a:ln>
+            <a:noFill/>
+          </a:ln>
+          <a:effectLst>
+            <a:glow>
+              <a:schemeClr val="accent1">
+                <a:alpha val="40000"/>
+              </a:schemeClr>
+            </a:glow>
+            <a:softEdge rad="0"/>
+          </a:effectLst>
+        </p:spPr>
+        <p:txBody>
+          <a:bodyPr wrap="square" rtlCol="0">
+            <a:spAutoFit/>
+          </a:bodyPr>
+          <a:lstStyle/>
+          <a:p>
+            <a:pPr algn="ctr"/>
+            <a:r>
+              <a:rPr lang="en-GB" sz="1400" b="1" dirty="0">
+                <a:solidFill>
+                  <a:schemeClr val="bg1"/>
+                </a:solidFill>
+                <a:latin typeface="CMU Serif Roman" charset="0"/>
+                <a:ea typeface="CMU Serif Roman" charset="0"/>
+                <a:cs typeface="CMU Serif Roman" charset="0"/>
+              </a:rPr>
+              <a:t>945.5 ka</a:t>
+            </a:r>
+            <a:endParaRPr lang="en-GB" b="1" dirty="0">
+              <a:solidFill>
+                <a:schemeClr val="bg1"/>
+              </a:solidFill>
+              <a:latin typeface="CMU Serif Roman" charset="0"/>
+              <a:ea typeface="CMU Serif Roman" charset="0"/>
+              <a:cs typeface="CMU Serif Roman" charset="0"/>
+            </a:endParaRPr>
+          </a:p>
+        </p:txBody>
+      </p:sp>
+      <p:cxnSp>
+        <p:nvCxnSpPr>
+          <p:cNvPr id="79" name="Straight Arrow Connector 78">
+            <a:extLst>
+              <a:ext uri="{FF2B5EF4-FFF2-40B4-BE49-F238E27FC236}">
+                <a16:creationId xmlns:a16="http://schemas.microsoft.com/office/drawing/2014/main" id="{CCE813C0-2BAC-124C-8A42-4750EFEF551C}"/>
+              </a:ext>
+            </a:extLst>
+          </p:cNvPr>
+          <p:cNvCxnSpPr>
+            <a:cxnSpLocks/>
+          </p:cNvCxnSpPr>
+          <p:nvPr/>
+        </p:nvCxnSpPr>
+        <p:spPr>
+          <a:xfrm flipH="1">
+            <a:off x="4695752" y="3696279"/>
+            <a:ext cx="481028" cy="0"/>
+          </a:xfrm>
+          <a:prstGeom prst="straightConnector1">
+            <a:avLst/>
+          </a:prstGeom>
+          <a:ln w="25400">
+            <a:solidFill>
+              <a:schemeClr val="tx1">
+                <a:alpha val="50000"/>
+              </a:schemeClr>
+            </a:solidFill>
+            <a:tailEnd type="triangle"/>
+          </a:ln>
+        </p:spPr>
+        <p:style>
+          <a:lnRef idx="1">
+            <a:schemeClr val="accent1"/>
+          </a:lnRef>
+          <a:fillRef idx="0">
+            <a:schemeClr val="accent1"/>
+          </a:fillRef>
+          <a:effectRef idx="0">
+            <a:schemeClr val="accent1"/>
+          </a:effectRef>
+          <a:fontRef idx="minor">
+            <a:schemeClr val="tx1"/>
+          </a:fontRef>
+        </p:style>
+      </p:cxnSp>
+      <p:sp>
+        <p:nvSpPr>
+          <p:cNvPr id="80" name="TextBox 79">
+            <a:extLst>
+              <a:ext uri="{FF2B5EF4-FFF2-40B4-BE49-F238E27FC236}">
+                <a16:creationId xmlns:a16="http://schemas.microsoft.com/office/drawing/2014/main" id="{3FBAD138-B0DE-5C4C-8D75-7F41C26A6C84}"/>
+              </a:ext>
+            </a:extLst>
+          </p:cNvPr>
+          <p:cNvSpPr txBox="1"/>
+          <p:nvPr/>
+        </p:nvSpPr>
+        <p:spPr>
+          <a:xfrm>
+            <a:off x="5233345" y="3555819"/>
+            <a:ext cx="862574" cy="307777"/>
+          </a:xfrm>
+          <a:prstGeom prst="rect">
+            <a:avLst/>
+          </a:prstGeom>
+          <a:solidFill>
+            <a:schemeClr val="bg1">
+              <a:alpha val="70000"/>
+            </a:schemeClr>
+          </a:solidFill>
+          <a:ln>
+            <a:noFill/>
+          </a:ln>
+          <a:effectLst>
+            <a:glow>
+              <a:schemeClr val="accent1">
+                <a:alpha val="40000"/>
+              </a:schemeClr>
+            </a:glow>
+            <a:softEdge rad="0"/>
+          </a:effectLst>
+        </p:spPr>
+        <p:txBody>
+          <a:bodyPr wrap="square" rtlCol="0">
+            <a:spAutoFit/>
+          </a:bodyPr>
+          <a:lstStyle/>
+          <a:p>
+            <a:pPr algn="ctr"/>
+            <a:r>
+              <a:rPr lang="en-GB" sz="1400" b="1" dirty="0">
+                <a:solidFill>
+                  <a:schemeClr val="bg1"/>
+                </a:solidFill>
+                <a:latin typeface="CMU Serif Roman" charset="0"/>
+                <a:ea typeface="CMU Serif Roman" charset="0"/>
+                <a:cs typeface="CMU Serif Roman" charset="0"/>
+              </a:rPr>
+              <a:t>271.4 ka</a:t>
+            </a:r>
+            <a:endParaRPr lang="en-GB" b="1" dirty="0">
+              <a:solidFill>
+                <a:schemeClr val="bg1"/>
+              </a:solidFill>
+              <a:latin typeface="CMU Serif Roman" charset="0"/>
+              <a:ea typeface="CMU Serif Roman" charset="0"/>
+              <a:cs typeface="CMU Serif Roman" charset="0"/>
+            </a:endParaRPr>
+          </a:p>
+        </p:txBody>
+      </p:sp>
+      <p:cxnSp>
+        <p:nvCxnSpPr>
+          <p:cNvPr id="81" name="Straight Arrow Connector 80">
+            <a:extLst>
+              <a:ext uri="{FF2B5EF4-FFF2-40B4-BE49-F238E27FC236}">
+                <a16:creationId xmlns:a16="http://schemas.microsoft.com/office/drawing/2014/main" id="{D7DE7833-BD6E-ED4D-A02C-D6FE6A4F4228}"/>
+              </a:ext>
+            </a:extLst>
+          </p:cNvPr>
+          <p:cNvCxnSpPr>
+            <a:cxnSpLocks/>
+          </p:cNvCxnSpPr>
+          <p:nvPr/>
+        </p:nvCxnSpPr>
+        <p:spPr>
+          <a:xfrm flipH="1">
+            <a:off x="4818070" y="3272163"/>
+            <a:ext cx="1609497" cy="0"/>
+          </a:xfrm>
+          <a:prstGeom prst="straightConnector1">
+            <a:avLst/>
+          </a:prstGeom>
+          <a:ln w="25400">
+            <a:solidFill>
+              <a:schemeClr val="tx1">
+                <a:alpha val="50000"/>
+              </a:schemeClr>
+            </a:solidFill>
+            <a:tailEnd type="triangle"/>
+          </a:ln>
+        </p:spPr>
+        <p:style>
+          <a:lnRef idx="1">
+            <a:schemeClr val="accent1"/>
+          </a:lnRef>
+          <a:fillRef idx="0">
+            <a:schemeClr val="accent1"/>
+          </a:fillRef>
+          <a:effectRef idx="0">
+            <a:schemeClr val="accent1"/>
+          </a:effectRef>
+          <a:fontRef idx="minor">
+            <a:schemeClr val="tx1"/>
+          </a:fontRef>
+        </p:style>
+      </p:cxnSp>
+      <p:sp>
+        <p:nvSpPr>
+          <p:cNvPr id="82" name="TextBox 81">
+            <a:extLst>
+              <a:ext uri="{FF2B5EF4-FFF2-40B4-BE49-F238E27FC236}">
+                <a16:creationId xmlns:a16="http://schemas.microsoft.com/office/drawing/2014/main" id="{D7EF3B84-D85A-4648-9D0A-2C853F9EBD57}"/>
+              </a:ext>
+            </a:extLst>
+          </p:cNvPr>
+          <p:cNvSpPr txBox="1"/>
+          <p:nvPr/>
+        </p:nvSpPr>
+        <p:spPr>
+          <a:xfrm>
+            <a:off x="6461617" y="3130599"/>
+            <a:ext cx="779566" cy="307777"/>
+          </a:xfrm>
+          <a:prstGeom prst="rect">
+            <a:avLst/>
+          </a:prstGeom>
+          <a:solidFill>
+            <a:schemeClr val="bg1">
+              <a:alpha val="70000"/>
+            </a:schemeClr>
+          </a:solidFill>
+          <a:ln>
+            <a:noFill/>
+          </a:ln>
+          <a:effectLst>
+            <a:glow>
+              <a:schemeClr val="accent1">
+                <a:alpha val="40000"/>
+              </a:schemeClr>
+            </a:glow>
+            <a:softEdge rad="0"/>
+          </a:effectLst>
+        </p:spPr>
+        <p:txBody>
+          <a:bodyPr wrap="square" rtlCol="0">
+            <a:spAutoFit/>
+          </a:bodyPr>
+          <a:lstStyle/>
+          <a:p>
+            <a:pPr algn="ctr"/>
+            <a:r>
+              <a:rPr lang="en-GB" sz="1400" b="1" dirty="0">
+                <a:solidFill>
+                  <a:schemeClr val="bg1"/>
+                </a:solidFill>
+                <a:latin typeface="CMU Serif Roman" charset="0"/>
+                <a:ea typeface="CMU Serif Roman" charset="0"/>
+                <a:cs typeface="CMU Serif Roman" charset="0"/>
+              </a:rPr>
+              <a:t>96.0 ka</a:t>
+            </a:r>
+            <a:endParaRPr lang="en-GB" b="1" dirty="0">
+              <a:solidFill>
+                <a:schemeClr val="bg1"/>
+              </a:solidFill>
+              <a:latin typeface="CMU Serif Roman" charset="0"/>
+              <a:ea typeface="CMU Serif Roman" charset="0"/>
+              <a:cs typeface="CMU Serif Roman" charset="0"/>
+            </a:endParaRPr>
+          </a:p>
+        </p:txBody>
+      </p:sp>
+      <p:cxnSp>
+        <p:nvCxnSpPr>
+          <p:cNvPr id="85" name="Straight Arrow Connector 84">
+            <a:extLst>
+              <a:ext uri="{FF2B5EF4-FFF2-40B4-BE49-F238E27FC236}">
+                <a16:creationId xmlns:a16="http://schemas.microsoft.com/office/drawing/2014/main" id="{3CEE8249-1666-704C-A0A7-1FC1F1CFA483}"/>
+              </a:ext>
+            </a:extLst>
+          </p:cNvPr>
+          <p:cNvCxnSpPr>
+            <a:cxnSpLocks/>
+          </p:cNvCxnSpPr>
+          <p:nvPr/>
+        </p:nvCxnSpPr>
+        <p:spPr>
+          <a:xfrm flipH="1">
+            <a:off x="5273952" y="2863769"/>
+            <a:ext cx="969798" cy="0"/>
+          </a:xfrm>
+          <a:prstGeom prst="straightConnector1">
+            <a:avLst/>
+          </a:prstGeom>
+          <a:ln w="25400">
+            <a:solidFill>
+              <a:schemeClr val="tx1">
+                <a:alpha val="50000"/>
+              </a:schemeClr>
+            </a:solidFill>
+            <a:tailEnd type="triangle"/>
+          </a:ln>
+        </p:spPr>
+        <p:style>
+          <a:lnRef idx="1">
+            <a:schemeClr val="accent1"/>
+          </a:lnRef>
+          <a:fillRef idx="0">
+            <a:schemeClr val="accent1"/>
+          </a:fillRef>
+          <a:effectRef idx="0">
+            <a:schemeClr val="accent1"/>
+          </a:effectRef>
+          <a:fontRef idx="minor">
+            <a:schemeClr val="tx1"/>
+          </a:fontRef>
+        </p:style>
+      </p:cxnSp>
+      <p:sp>
+        <p:nvSpPr>
+          <p:cNvPr id="86" name="TextBox 85">
+            <a:extLst>
+              <a:ext uri="{FF2B5EF4-FFF2-40B4-BE49-F238E27FC236}">
+                <a16:creationId xmlns:a16="http://schemas.microsoft.com/office/drawing/2014/main" id="{9679AC03-580D-184A-9128-B97137FB0795}"/>
+              </a:ext>
+            </a:extLst>
+          </p:cNvPr>
+          <p:cNvSpPr txBox="1"/>
+          <p:nvPr/>
+        </p:nvSpPr>
+        <p:spPr>
+          <a:xfrm>
+            <a:off x="6315393" y="2707247"/>
+            <a:ext cx="779566" cy="307777"/>
+          </a:xfrm>
+          <a:prstGeom prst="rect">
+            <a:avLst/>
+          </a:prstGeom>
+          <a:solidFill>
+            <a:schemeClr val="bg1">
+              <a:alpha val="70000"/>
+            </a:schemeClr>
+          </a:solidFill>
+          <a:ln>
+            <a:noFill/>
+          </a:ln>
+          <a:effectLst>
+            <a:glow>
+              <a:schemeClr val="accent1">
+                <a:alpha val="40000"/>
+              </a:schemeClr>
+            </a:glow>
+            <a:softEdge rad="0"/>
+          </a:effectLst>
+        </p:spPr>
+        <p:txBody>
+          <a:bodyPr wrap="square" rtlCol="0">
+            <a:spAutoFit/>
+          </a:bodyPr>
+          <a:lstStyle/>
+          <a:p>
+            <a:pPr algn="ctr"/>
+            <a:r>
+              <a:rPr lang="en-GB" sz="1400" b="1" dirty="0">
+                <a:solidFill>
+                  <a:schemeClr val="bg1"/>
+                </a:solidFill>
+                <a:latin typeface="CMU Serif Roman" charset="0"/>
+                <a:ea typeface="CMU Serif Roman" charset="0"/>
+                <a:cs typeface="CMU Serif Roman" charset="0"/>
+              </a:rPr>
+              <a:t>38.9 ka</a:t>
+            </a:r>
+            <a:endParaRPr lang="en-GB" b="1" dirty="0">
+              <a:solidFill>
+                <a:schemeClr val="bg1"/>
+              </a:solidFill>
+              <a:latin typeface="CMU Serif Roman" charset="0"/>
+              <a:ea typeface="CMU Serif Roman" charset="0"/>
+              <a:cs typeface="CMU Serif Roman" charset="0"/>
+            </a:endParaRPr>
+          </a:p>
+        </p:txBody>
+      </p:sp>
     </p:spTree>
     <p:extLst>
       <p:ext uri="{BB962C8B-B14F-4D97-AF65-F5344CB8AC3E}">

</xml_diff>